<commit_message>
Added rough outline for first couple of slides - will make prettier later
</commit_message>
<xml_diff>
--- a/presentation/final-presentation.pptx
+++ b/presentation/final-presentation.pptx
@@ -113,13 +113,18 @@
       </a:defRPr>
     </a:lvl9pPr>
   </p:defaultTextStyle>
+  <p:extLst>
+    <p:ext uri="{EFAFB233-063F-42B5-8137-9DF3F51BA10A}">
+      <p15:sldGuideLst xmlns:p15="http://schemas.microsoft.com/office/powerpoint/2012/main"/>
+    </p:ext>
+  </p:extLst>
 </p:presentation>
 </file>
 
 <file path=ppt/revisionInfo.xml><?xml version="1.0" encoding="utf-8"?>
 <p1510:revInfo xmlns:a="http://schemas.openxmlformats.org/drawingml/2006/main" xmlns:r="http://schemas.openxmlformats.org/officeDocument/2006/relationships" xmlns:p1510="http://schemas.microsoft.com/office/powerpoint/2015/10/main">
   <p1510:revLst>
-    <p1510:client id="{98C76723-AA43-4380-8E4D-B8026509F880}" v="5" dt="2021-04-19T14:58:15.302"/>
+    <p1510:client id="{D5C3F0AF-4CDB-4F83-B89A-4FCD27EF4FE5}" v="1" dt="2021-04-20T14:49:41.392"/>
   </p1510:revLst>
 </p1510:revInfo>
 </file>
@@ -174,6 +179,107 @@
       </pc:sldChg>
     </pc:docChg>
   </pc:docChgLst>
+  <pc:docChgLst>
+    <pc:chgData name="Alison Kleffner" userId="0bed3509-e787-48f4-9a13-47afcd2529d5" providerId="ADAL" clId="{D5C3F0AF-4CDB-4F83-B89A-4FCD27EF4FE5}"/>
+    <pc:docChg chg="undo custSel modSld">
+      <pc:chgData name="Alison Kleffner" userId="0bed3509-e787-48f4-9a13-47afcd2529d5" providerId="ADAL" clId="{D5C3F0AF-4CDB-4F83-B89A-4FCD27EF4FE5}" dt="2021-04-20T15:03:11.375" v="143" actId="20577"/>
+      <pc:docMkLst>
+        <pc:docMk/>
+      </pc:docMkLst>
+      <pc:sldChg chg="modSp mod">
+        <pc:chgData name="Alison Kleffner" userId="0bed3509-e787-48f4-9a13-47afcd2529d5" providerId="ADAL" clId="{D5C3F0AF-4CDB-4F83-B89A-4FCD27EF4FE5}" dt="2021-04-20T15:03:11.375" v="143" actId="20577"/>
+        <pc:sldMkLst>
+          <pc:docMk/>
+          <pc:sldMk cId="3581702329" sldId="257"/>
+        </pc:sldMkLst>
+        <pc:spChg chg="mod">
+          <ac:chgData name="Alison Kleffner" userId="0bed3509-e787-48f4-9a13-47afcd2529d5" providerId="ADAL" clId="{D5C3F0AF-4CDB-4F83-B89A-4FCD27EF4FE5}" dt="2021-04-20T15:03:11.375" v="143" actId="20577"/>
+          <ac:spMkLst>
+            <pc:docMk/>
+            <pc:sldMk cId="3581702329" sldId="257"/>
+            <ac:spMk id="3" creationId="{1480425F-5ADD-42BD-A8E6-730F5E080DD7}"/>
+          </ac:spMkLst>
+        </pc:spChg>
+      </pc:sldChg>
+      <pc:sldChg chg="addSp delSp modSp mod modClrScheme chgLayout">
+        <pc:chgData name="Alison Kleffner" userId="0bed3509-e787-48f4-9a13-47afcd2529d5" providerId="ADAL" clId="{D5C3F0AF-4CDB-4F83-B89A-4FCD27EF4FE5}" dt="2021-04-20T14:50:56.874" v="47" actId="27636"/>
+        <pc:sldMkLst>
+          <pc:docMk/>
+          <pc:sldMk cId="3724156524" sldId="258"/>
+        </pc:sldMkLst>
+        <pc:spChg chg="mod ord">
+          <ac:chgData name="Alison Kleffner" userId="0bed3509-e787-48f4-9a13-47afcd2529d5" providerId="ADAL" clId="{D5C3F0AF-4CDB-4F83-B89A-4FCD27EF4FE5}" dt="2021-04-20T14:49:13.805" v="34" actId="700"/>
+          <ac:spMkLst>
+            <pc:docMk/>
+            <pc:sldMk cId="3724156524" sldId="258"/>
+            <ac:spMk id="2" creationId="{D0B5DB17-1A39-4AB5-9E1C-C0AAF30CFF19}"/>
+          </ac:spMkLst>
+        </pc:spChg>
+        <pc:spChg chg="del mod ord">
+          <ac:chgData name="Alison Kleffner" userId="0bed3509-e787-48f4-9a13-47afcd2529d5" providerId="ADAL" clId="{D5C3F0AF-4CDB-4F83-B89A-4FCD27EF4FE5}" dt="2021-04-20T14:49:13.805" v="34" actId="700"/>
+          <ac:spMkLst>
+            <pc:docMk/>
+            <pc:sldMk cId="3724156524" sldId="258"/>
+            <ac:spMk id="3" creationId="{B72FF929-445C-4AC7-8711-04ED034FC73E}"/>
+          </ac:spMkLst>
+        </pc:spChg>
+        <pc:spChg chg="add mod ord">
+          <ac:chgData name="Alison Kleffner" userId="0bed3509-e787-48f4-9a13-47afcd2529d5" providerId="ADAL" clId="{D5C3F0AF-4CDB-4F83-B89A-4FCD27EF4FE5}" dt="2021-04-20T14:50:56.874" v="47" actId="27636"/>
+          <ac:spMkLst>
+            <pc:docMk/>
+            <pc:sldMk cId="3724156524" sldId="258"/>
+            <ac:spMk id="4" creationId="{F8EF7BAF-2C73-49D5-9A95-EC13B95EAE9E}"/>
+          </ac:spMkLst>
+        </pc:spChg>
+        <pc:spChg chg="add del mod ord">
+          <ac:chgData name="Alison Kleffner" userId="0bed3509-e787-48f4-9a13-47afcd2529d5" providerId="ADAL" clId="{D5C3F0AF-4CDB-4F83-B89A-4FCD27EF4FE5}" dt="2021-04-20T14:49:41.392" v="35" actId="931"/>
+          <ac:spMkLst>
+            <pc:docMk/>
+            <pc:sldMk cId="3724156524" sldId="258"/>
+            <ac:spMk id="5" creationId="{0272C3D7-A782-4D7C-93FB-6AEDB9A4B0CA}"/>
+          </ac:spMkLst>
+        </pc:spChg>
+        <pc:picChg chg="add mod">
+          <ac:chgData name="Alison Kleffner" userId="0bed3509-e787-48f4-9a13-47afcd2529d5" providerId="ADAL" clId="{D5C3F0AF-4CDB-4F83-B89A-4FCD27EF4FE5}" dt="2021-04-20T14:49:52.005" v="39" actId="1076"/>
+          <ac:picMkLst>
+            <pc:docMk/>
+            <pc:sldMk cId="3724156524" sldId="258"/>
+            <ac:picMk id="7" creationId="{3D72E8C0-2C18-495A-AF28-C65AC3278036}"/>
+          </ac:picMkLst>
+        </pc:picChg>
+      </pc:sldChg>
+      <pc:sldChg chg="modSp mod">
+        <pc:chgData name="Alison Kleffner" userId="0bed3509-e787-48f4-9a13-47afcd2529d5" providerId="ADAL" clId="{D5C3F0AF-4CDB-4F83-B89A-4FCD27EF4FE5}" dt="2021-04-20T14:36:50.859" v="9" actId="20577"/>
+        <pc:sldMkLst>
+          <pc:docMk/>
+          <pc:sldMk cId="1939212565" sldId="259"/>
+        </pc:sldMkLst>
+        <pc:spChg chg="mod">
+          <ac:chgData name="Alison Kleffner" userId="0bed3509-e787-48f4-9a13-47afcd2529d5" providerId="ADAL" clId="{D5C3F0AF-4CDB-4F83-B89A-4FCD27EF4FE5}" dt="2021-04-20T14:36:50.859" v="9" actId="20577"/>
+          <ac:spMkLst>
+            <pc:docMk/>
+            <pc:sldMk cId="1939212565" sldId="259"/>
+            <ac:spMk id="3" creationId="{4B299CBA-9011-4FA0-AC76-4145A240B644}"/>
+          </ac:spMkLst>
+        </pc:spChg>
+      </pc:sldChg>
+      <pc:sldChg chg="modSp mod">
+        <pc:chgData name="Alison Kleffner" userId="0bed3509-e787-48f4-9a13-47afcd2529d5" providerId="ADAL" clId="{D5C3F0AF-4CDB-4F83-B89A-4FCD27EF4FE5}" dt="2021-04-20T14:46:39.794" v="33" actId="27636"/>
+        <pc:sldMkLst>
+          <pc:docMk/>
+          <pc:sldMk cId="3830608638" sldId="260"/>
+        </pc:sldMkLst>
+        <pc:spChg chg="mod">
+          <ac:chgData name="Alison Kleffner" userId="0bed3509-e787-48f4-9a13-47afcd2529d5" providerId="ADAL" clId="{D5C3F0AF-4CDB-4F83-B89A-4FCD27EF4FE5}" dt="2021-04-20T14:46:39.794" v="33" actId="27636"/>
+          <ac:spMkLst>
+            <pc:docMk/>
+            <pc:sldMk cId="3830608638" sldId="260"/>
+            <ac:spMk id="3" creationId="{B70B73B9-D1AE-41E2-9605-8F8142D92E88}"/>
+          </ac:spMkLst>
+        </pc:spChg>
+      </pc:sldChg>
+    </pc:docChg>
+  </pc:docChgLst>
 </pc:chgInfo>
 </file>
 
@@ -324,7 +430,7 @@
           <a:p>
             <a:fld id="{BE28CA74-5754-4493-A5C1-EEAF0C566310}" type="datetimeFigureOut">
               <a:rPr lang="en-US" smtClean="0"/>
-              <a:t>4/19/2021</a:t>
+              <a:t>4/20/2021</a:t>
             </a:fld>
             <a:endParaRPr lang="en-US"/>
           </a:p>
@@ -522,7 +628,7 @@
           <a:p>
             <a:fld id="{BE28CA74-5754-4493-A5C1-EEAF0C566310}" type="datetimeFigureOut">
               <a:rPr lang="en-US" smtClean="0"/>
-              <a:t>4/19/2021</a:t>
+              <a:t>4/20/2021</a:t>
             </a:fld>
             <a:endParaRPr lang="en-US"/>
           </a:p>
@@ -730,7 +836,7 @@
           <a:p>
             <a:fld id="{BE28CA74-5754-4493-A5C1-EEAF0C566310}" type="datetimeFigureOut">
               <a:rPr lang="en-US" smtClean="0"/>
-              <a:t>4/19/2021</a:t>
+              <a:t>4/20/2021</a:t>
             </a:fld>
             <a:endParaRPr lang="en-US"/>
           </a:p>
@@ -928,7 +1034,7 @@
           <a:p>
             <a:fld id="{BE28CA74-5754-4493-A5C1-EEAF0C566310}" type="datetimeFigureOut">
               <a:rPr lang="en-US" smtClean="0"/>
-              <a:t>4/19/2021</a:t>
+              <a:t>4/20/2021</a:t>
             </a:fld>
             <a:endParaRPr lang="en-US"/>
           </a:p>
@@ -1203,7 +1309,7 @@
           <a:p>
             <a:fld id="{BE28CA74-5754-4493-A5C1-EEAF0C566310}" type="datetimeFigureOut">
               <a:rPr lang="en-US" smtClean="0"/>
-              <a:t>4/19/2021</a:t>
+              <a:t>4/20/2021</a:t>
             </a:fld>
             <a:endParaRPr lang="en-US"/>
           </a:p>
@@ -1468,7 +1574,7 @@
           <a:p>
             <a:fld id="{BE28CA74-5754-4493-A5C1-EEAF0C566310}" type="datetimeFigureOut">
               <a:rPr lang="en-US" smtClean="0"/>
-              <a:t>4/19/2021</a:t>
+              <a:t>4/20/2021</a:t>
             </a:fld>
             <a:endParaRPr lang="en-US"/>
           </a:p>
@@ -1880,7 +1986,7 @@
           <a:p>
             <a:fld id="{BE28CA74-5754-4493-A5C1-EEAF0C566310}" type="datetimeFigureOut">
               <a:rPr lang="en-US" smtClean="0"/>
-              <a:t>4/19/2021</a:t>
+              <a:t>4/20/2021</a:t>
             </a:fld>
             <a:endParaRPr lang="en-US"/>
           </a:p>
@@ -2021,7 +2127,7 @@
           <a:p>
             <a:fld id="{BE28CA74-5754-4493-A5C1-EEAF0C566310}" type="datetimeFigureOut">
               <a:rPr lang="en-US" smtClean="0"/>
-              <a:t>4/19/2021</a:t>
+              <a:t>4/20/2021</a:t>
             </a:fld>
             <a:endParaRPr lang="en-US"/>
           </a:p>
@@ -2134,7 +2240,7 @@
           <a:p>
             <a:fld id="{BE28CA74-5754-4493-A5C1-EEAF0C566310}" type="datetimeFigureOut">
               <a:rPr lang="en-US" smtClean="0"/>
-              <a:t>4/19/2021</a:t>
+              <a:t>4/20/2021</a:t>
             </a:fld>
             <a:endParaRPr lang="en-US"/>
           </a:p>
@@ -2445,7 +2551,7 @@
           <a:p>
             <a:fld id="{BE28CA74-5754-4493-A5C1-EEAF0C566310}" type="datetimeFigureOut">
               <a:rPr lang="en-US" smtClean="0"/>
-              <a:t>4/19/2021</a:t>
+              <a:t>4/20/2021</a:t>
             </a:fld>
             <a:endParaRPr lang="en-US"/>
           </a:p>
@@ -2733,7 +2839,7 @@
           <a:p>
             <a:fld id="{BE28CA74-5754-4493-A5C1-EEAF0C566310}" type="datetimeFigureOut">
               <a:rPr lang="en-US" smtClean="0"/>
-              <a:t>4/19/2021</a:t>
+              <a:t>4/20/2021</a:t>
             </a:fld>
             <a:endParaRPr lang="en-US"/>
           </a:p>
@@ -2974,7 +3080,7 @@
           <a:p>
             <a:fld id="{BE28CA74-5754-4493-A5C1-EEAF0C566310}" type="datetimeFigureOut">
               <a:rPr lang="en-US" smtClean="0"/>
-              <a:t>4/19/2021</a:t>
+              <a:t>4/20/2021</a:t>
             </a:fld>
             <a:endParaRPr lang="en-US"/>
           </a:p>
@@ -4682,10 +4788,45 @@
         </p:nvSpPr>
         <p:spPr/>
         <p:txBody>
-          <a:bodyPr/>
-          <a:lstStyle/>
-          <a:p>
-            <a:endParaRPr lang="en-US"/>
+          <a:bodyPr>
+            <a:normAutofit fontScale="92500" lnSpcReduction="20000"/>
+          </a:bodyPr>
+          <a:lstStyle/>
+          <a:p>
+            <a:r>
+              <a:rPr lang="en-US" dirty="0"/>
+              <a:t>Successful marketing campaigns and productive selling strategies are directly linked to communication about key indicators of quality; hence, objective measurements of quality are essential</a:t>
+            </a:r>
+          </a:p>
+          <a:p>
+            <a:r>
+              <a:rPr lang="en-US" dirty="0"/>
+              <a:t>Within the wine industry, there are two types of quality assessment: physiochemical and sensory tests. Sensory tests require a human expert to assess the quality of wine based on visual, taste, and smell [Hu et al., 2016]</a:t>
+            </a:r>
+          </a:p>
+          <a:p>
+            <a:r>
+              <a:rPr lang="en-US"/>
+              <a:t>Unlike </a:t>
+            </a:r>
+            <a:r>
+              <a:rPr lang="en-US" dirty="0"/>
+              <a:t>sensory tests, laboratory tests for measuring the physiochemical characteristics of wine such as acidity and alcohol content do not require a human expert. The relationship between </a:t>
+            </a:r>
+            <a:r>
+              <a:rPr lang="en-US" dirty="0" err="1"/>
+              <a:t>physiochemcial</a:t>
+            </a:r>
+            <a:r>
+              <a:rPr lang="en-US" dirty="0"/>
+              <a:t> and sensory analysis is not well understood. Recently, research in the food industry has utilized statistical learning techniques to evaluate widely available characteristics of wine. </a:t>
+            </a:r>
+          </a:p>
+          <a:p>
+            <a:r>
+              <a:rPr lang="en-US" dirty="0"/>
+              <a:t>Classification can then be used as part of quality assessment process. </a:t>
+            </a:r>
           </a:p>
         </p:txBody>
       </p:sp>
@@ -4749,29 +4890,102 @@
       </p:sp>
       <p:sp>
         <p:nvSpPr>
-          <p:cNvPr id="3" name="Content Placeholder 2">
-            <a:extLst>
-              <a:ext uri="{FF2B5EF4-FFF2-40B4-BE49-F238E27FC236}">
-                <a16:creationId xmlns:a16="http://schemas.microsoft.com/office/drawing/2014/main" id="{B72FF929-445C-4AC7-8711-04ED034FC73E}"/>
-              </a:ext>
-            </a:extLst>
-          </p:cNvPr>
-          <p:cNvSpPr>
-            <a:spLocks noGrp="1"/>
-          </p:cNvSpPr>
-          <p:nvPr>
-            <p:ph idx="1"/>
-          </p:nvPr>
-        </p:nvSpPr>
-        <p:spPr/>
-        <p:txBody>
-          <a:bodyPr/>
-          <a:lstStyle/>
-          <a:p>
-            <a:endParaRPr lang="en-US"/>
-          </a:p>
-        </p:txBody>
-      </p:sp>
+          <p:cNvPr id="4" name="Content Placeholder 3">
+            <a:extLst>
+              <a:ext uri="{FF2B5EF4-FFF2-40B4-BE49-F238E27FC236}">
+                <a16:creationId xmlns:a16="http://schemas.microsoft.com/office/drawing/2014/main" id="{F8EF7BAF-2C73-49D5-9A95-EC13B95EAE9E}"/>
+              </a:ext>
+            </a:extLst>
+          </p:cNvPr>
+          <p:cNvSpPr>
+            <a:spLocks noGrp="1"/>
+          </p:cNvSpPr>
+          <p:nvPr>
+            <p:ph sz="half" idx="1"/>
+          </p:nvPr>
+        </p:nvSpPr>
+        <p:spPr>
+          <a:xfrm>
+            <a:off x="838199" y="1825624"/>
+            <a:ext cx="5921049" cy="4378227"/>
+          </a:xfrm>
+        </p:spPr>
+        <p:txBody>
+          <a:bodyPr>
+            <a:normAutofit fontScale="70000" lnSpcReduction="20000"/>
+          </a:bodyPr>
+          <a:lstStyle/>
+          <a:p>
+            <a:r>
+              <a:rPr lang="en-US" dirty="0"/>
+              <a:t>In this paper, we applied classification and resampling techniques to the “Wine Quality Data Set” found on the UCI Data Repository [UCI]. The data consist of information from samples of </a:t>
+            </a:r>
+            <a:r>
+              <a:rPr lang="en-US" dirty="0" err="1"/>
+              <a:t>Vinho</a:t>
+            </a:r>
+            <a:r>
+              <a:rPr lang="en-US" dirty="0"/>
+              <a:t> Verde, which is a product from the northwest region of Portugal</a:t>
+            </a:r>
+          </a:p>
+          <a:p>
+            <a:r>
+              <a:rPr lang="en-US" dirty="0"/>
+              <a:t>For each of the wines in the dataset, 11 physiochemical measurements were taken on it: </a:t>
+            </a:r>
+            <a:r>
+              <a:rPr lang="en-US" dirty="0" err="1"/>
+              <a:t>fxed</a:t>
+            </a:r>
+            <a:r>
+              <a:rPr lang="en-US" dirty="0"/>
+              <a:t> acidity, volatile acidity, citric acid, residual sugar, chlorides, free sulfur dioxide, total sulfur dioxide, density, pH, sulphates, and alcohol.</a:t>
+            </a:r>
+          </a:p>
+          <a:p>
+            <a:r>
+              <a:rPr lang="en-US" dirty="0"/>
+              <a:t>The response was measured as a quality rating based on a sensory test carried out by at least three sommeliers, where a 0 was considered very bad and a 10 was excellent Gupta [2018]. Following Hu et al. [2016], we separated the wine into three quality classes: Low Quality (≤ 4), Normal (5-7), and High quality (≥ 8)</a:t>
+            </a:r>
+          </a:p>
+        </p:txBody>
+      </p:sp>
+      <p:pic>
+        <p:nvPicPr>
+          <p:cNvPr id="7" name="Content Placeholder 6" descr="Chart, bar chart&#10;&#10;Description automatically generated">
+            <a:extLst>
+              <a:ext uri="{FF2B5EF4-FFF2-40B4-BE49-F238E27FC236}">
+                <a16:creationId xmlns:a16="http://schemas.microsoft.com/office/drawing/2014/main" id="{3D72E8C0-2C18-495A-AF28-C65AC3278036}"/>
+              </a:ext>
+            </a:extLst>
+          </p:cNvPr>
+          <p:cNvPicPr>
+            <a:picLocks noGrp="1" noChangeAspect="1"/>
+          </p:cNvPicPr>
+          <p:nvPr>
+            <p:ph sz="half" idx="2"/>
+          </p:nvPr>
+        </p:nvPicPr>
+        <p:blipFill>
+          <a:blip r:embed="rId2">
+            <a:extLst>
+              <a:ext uri="{28A0092B-C50C-407E-A947-70E740481C1C}">
+                <a14:useLocalDpi xmlns:a14="http://schemas.microsoft.com/office/drawing/2010/main" val="0"/>
+              </a:ext>
+            </a:extLst>
+          </a:blip>
+          <a:stretch>
+            <a:fillRect/>
+          </a:stretch>
+        </p:blipFill>
+        <p:spPr>
+          <a:xfrm>
+            <a:off x="6759249" y="1212239"/>
+            <a:ext cx="5020376" cy="2789055"/>
+          </a:xfrm>
+        </p:spPr>
+      </p:pic>
     </p:spTree>
     <p:extLst>
       <p:ext uri="{BB962C8B-B14F-4D97-AF65-F5344CB8AC3E}">
@@ -4848,10 +5062,61 @@
         </p:nvSpPr>
         <p:spPr/>
         <p:txBody>
-          <a:bodyPr/>
-          <a:lstStyle/>
-          <a:p>
-            <a:endParaRPr lang="en-US"/>
+          <a:bodyPr>
+            <a:normAutofit fontScale="85000" lnSpcReduction="20000"/>
+          </a:bodyPr>
+          <a:lstStyle/>
+          <a:p>
+            <a:r>
+              <a:rPr lang="en-US" dirty="0"/>
+              <a:t>The goal of this paper, following Hu et al. [2016] is to train a model that would work well to classify wines into three categories, which are: low quality, normal quality and high quality.</a:t>
+            </a:r>
+          </a:p>
+          <a:p>
+            <a:r>
+              <a:rPr lang="en-US" dirty="0"/>
+              <a:t>We evaluated two classification techniques, </a:t>
+            </a:r>
+            <a:r>
+              <a:rPr lang="en-US" dirty="0" err="1"/>
+              <a:t>eXtreme</a:t>
+            </a:r>
+            <a:r>
+              <a:rPr lang="en-US" dirty="0"/>
+              <a:t> Gradient Boosting (</a:t>
+            </a:r>
+            <a:r>
+              <a:rPr lang="en-US" dirty="0" err="1"/>
+              <a:t>XGBoost</a:t>
+            </a:r>
+            <a:r>
+              <a:rPr lang="en-US" dirty="0"/>
+              <a:t>) and Random Forest</a:t>
+            </a:r>
+          </a:p>
+          <a:p>
+            <a:r>
+              <a:rPr lang="en-US" dirty="0"/>
+              <a:t>The quality categorization poses a challenge of working with imbalanced classes as there are many more normal quality wines than low or high quality wines [Figure 1].</a:t>
+            </a:r>
+          </a:p>
+          <a:p>
+            <a:r>
+              <a:rPr lang="en-US" dirty="0"/>
+              <a:t> To address this, we will evaluate different resampling techniques in order to determine if resampling improves performance and to identify which resampling method is best. </a:t>
+            </a:r>
+          </a:p>
+          <a:p>
+            <a:r>
+              <a:rPr lang="en-US" dirty="0"/>
+              <a:t>Accuracy of each classification model applied in conjunction with each resampling method was compared. </a:t>
+            </a:r>
+          </a:p>
+          <a:p>
+            <a:r>
+              <a:rPr lang="en-US" dirty="0"/>
+              <a:t>Initially, we first evaluated the classifier performance with no resampling</a:t>
+            </a:r>
           </a:p>
         </p:txBody>
       </p:sp>
@@ -4931,10 +5196,61 @@
         </p:nvSpPr>
         <p:spPr/>
         <p:txBody>
-          <a:bodyPr/>
-          <a:lstStyle/>
-          <a:p>
-            <a:endParaRPr lang="en-US"/>
+          <a:bodyPr>
+            <a:normAutofit fontScale="62500" lnSpcReduction="20000"/>
+          </a:bodyPr>
+          <a:lstStyle/>
+          <a:p>
+            <a:r>
+              <a:rPr lang="en-US" dirty="0"/>
+              <a:t>Typical classifier algorithms assume a relatively balanced distribution across the classes, so with imbalanced data there tends to be bias towards the majority class [Sun et al., 2009]</a:t>
+            </a:r>
+          </a:p>
+          <a:p>
+            <a:r>
+              <a:rPr lang="en-US" dirty="0"/>
+              <a:t>Due to this imbalanced nature in the data, classifying algorithms will be biased towards classifying wines as “Normal,” causing poor predictions for the “Low” and “High” quality classes.</a:t>
+            </a:r>
+          </a:p>
+          <a:p>
+            <a:r>
+              <a:rPr lang="en-US" dirty="0"/>
+              <a:t>A method on how to lower the effects on working with an imbalanced data set is through resampling the original data set either by either oversampling the majority class, or undersampling the minority class. The goal with these methods is to create a data set that has close to a balanced class distribution, so the classifying algorithms will have better predictions due to being able to predict to the minority class more accurately [</a:t>
+            </a:r>
+            <a:r>
+              <a:rPr lang="en-US" dirty="0" err="1"/>
+              <a:t>Hoens</a:t>
+            </a:r>
+            <a:r>
+              <a:rPr lang="en-US" dirty="0"/>
+              <a:t> and Chawla, 2013].</a:t>
+            </a:r>
+          </a:p>
+          <a:p>
+            <a:r>
+              <a:rPr lang="en-US" dirty="0"/>
+              <a:t>We initially evaluated the classifier performance with the original imbalanced data set (without resampling), and hypothesized that it would be associated with low performance, however, we felt it provided an appropriate baseline</a:t>
+            </a:r>
+          </a:p>
+          <a:p>
+            <a:r>
+              <a:rPr lang="en-US" dirty="0"/>
+              <a:t>The undersampling method that we considered is random undersampling. In this method, instances of the majority class are discarded at random until reaches balanced with the minority class [</a:t>
+            </a:r>
+            <a:r>
+              <a:rPr lang="en-US" dirty="0" err="1"/>
+              <a:t>Hoens</a:t>
+            </a:r>
+            <a:r>
+              <a:rPr lang="en-US" dirty="0"/>
+              <a:t> and Chawla, 2013].</a:t>
+            </a:r>
+          </a:p>
+          <a:p>
+            <a:r>
+              <a:rPr lang="en-US" dirty="0"/>
+              <a:t>Next, we handled imbalanced data through resampling the original data set by oversampling the majority class using the SMOTE method, which is a technique that uses interpolation of the minority class to create synthetic data</a:t>
+            </a:r>
           </a:p>
         </p:txBody>
       </p:sp>

</xml_diff>

<commit_message>
Results and Discussion slides filled out, added an additional slide for tuning parameters before seeing the final slide.
</commit_message>
<xml_diff>
--- a/presentation/final-presentation.pptx
+++ b/presentation/final-presentation.pptx
@@ -5,7 +5,7 @@
     <p:sldMasterId id="2147483648" r:id="rId1"/>
   </p:sldMasterIdLst>
   <p:notesMasterIdLst>
-    <p:notesMasterId r:id="rId14"/>
+    <p:notesMasterId r:id="rId15"/>
   </p:notesMasterIdLst>
   <p:sldIdLst>
     <p:sldId id="256" r:id="rId2"/>
@@ -16,10 +16,11 @@
     <p:sldId id="262" r:id="rId7"/>
     <p:sldId id="261" r:id="rId8"/>
     <p:sldId id="267" r:id="rId9"/>
-    <p:sldId id="264" r:id="rId10"/>
-    <p:sldId id="265" r:id="rId11"/>
-    <p:sldId id="266" r:id="rId12"/>
-    <p:sldId id="269" r:id="rId13"/>
+    <p:sldId id="270" r:id="rId10"/>
+    <p:sldId id="271" r:id="rId11"/>
+    <p:sldId id="272" r:id="rId12"/>
+    <p:sldId id="266" r:id="rId13"/>
+    <p:sldId id="269" r:id="rId14"/>
   </p:sldIdLst>
   <p:sldSz cx="12192000" cy="6858000"/>
   <p:notesSz cx="6858000" cy="9144000"/>
@@ -2452,6 +2453,289 @@
     <p:extLst>
       <p:ext uri="{BB962C8B-B14F-4D97-AF65-F5344CB8AC3E}">
         <p14:creationId xmlns:p14="http://schemas.microsoft.com/office/powerpoint/2010/main" val="3174983462"/>
+      </p:ext>
+    </p:extLst>
+  </p:cSld>
+  <p:clrMapOvr>
+    <a:masterClrMapping/>
+  </p:clrMapOvr>
+</p:notes>
+</file>
+
+<file path=ppt/notesSlides/notesSlide3.xml><?xml version="1.0" encoding="utf-8"?>
+<p:notes xmlns:a="http://schemas.openxmlformats.org/drawingml/2006/main" xmlns:r="http://schemas.openxmlformats.org/officeDocument/2006/relationships" xmlns:p="http://schemas.openxmlformats.org/presentationml/2006/main">
+  <p:cSld>
+    <p:spTree>
+      <p:nvGrpSpPr>
+        <p:cNvPr id="1" name=""/>
+        <p:cNvGrpSpPr/>
+        <p:nvPr/>
+      </p:nvGrpSpPr>
+      <p:grpSpPr>
+        <a:xfrm>
+          <a:off x="0" y="0"/>
+          <a:ext cx="0" cy="0"/>
+          <a:chOff x="0" y="0"/>
+          <a:chExt cx="0" cy="0"/>
+        </a:xfrm>
+      </p:grpSpPr>
+      <p:sp>
+        <p:nvSpPr>
+          <p:cNvPr id="2" name="Slide Image Placeholder 1"/>
+          <p:cNvSpPr>
+            <a:spLocks noGrp="1" noRot="1" noChangeAspect="1"/>
+          </p:cNvSpPr>
+          <p:nvPr>
+            <p:ph type="sldImg"/>
+          </p:nvPr>
+        </p:nvSpPr>
+        <p:spPr/>
+      </p:sp>
+      <p:sp>
+        <p:nvSpPr>
+          <p:cNvPr id="3" name="Notes Placeholder 2"/>
+          <p:cNvSpPr>
+            <a:spLocks noGrp="1"/>
+          </p:cNvSpPr>
+          <p:nvPr>
+            <p:ph type="body" idx="1"/>
+          </p:nvPr>
+        </p:nvSpPr>
+        <p:spPr/>
+        <p:txBody>
+          <a:bodyPr/>
+          <a:lstStyle/>
+          <a:p>
+            <a:endParaRPr lang="en-US" dirty="0"/>
+          </a:p>
+        </p:txBody>
+      </p:sp>
+      <p:sp>
+        <p:nvSpPr>
+          <p:cNvPr id="4" name="Slide Number Placeholder 3"/>
+          <p:cNvSpPr>
+            <a:spLocks noGrp="1"/>
+          </p:cNvSpPr>
+          <p:nvPr>
+            <p:ph type="sldNum" sz="quarter" idx="5"/>
+          </p:nvPr>
+        </p:nvSpPr>
+        <p:spPr/>
+        <p:txBody>
+          <a:bodyPr/>
+          <a:lstStyle/>
+          <a:p>
+            <a:fld id="{EED578F8-5C61-4F2D-A9E3-FDA016A0ABC4}" type="slidenum">
+              <a:rPr lang="en-US" smtClean="0"/>
+              <a:t>9</a:t>
+            </a:fld>
+            <a:endParaRPr lang="en-US"/>
+          </a:p>
+        </p:txBody>
+      </p:sp>
+    </p:spTree>
+    <p:extLst>
+      <p:ext uri="{BB962C8B-B14F-4D97-AF65-F5344CB8AC3E}">
+        <p14:creationId xmlns:p14="http://schemas.microsoft.com/office/powerpoint/2010/main" val="257430941"/>
+      </p:ext>
+    </p:extLst>
+  </p:cSld>
+  <p:clrMapOvr>
+    <a:masterClrMapping/>
+  </p:clrMapOvr>
+</p:notes>
+</file>
+
+<file path=ppt/notesSlides/notesSlide4.xml><?xml version="1.0" encoding="utf-8"?>
+<p:notes xmlns:a="http://schemas.openxmlformats.org/drawingml/2006/main" xmlns:r="http://schemas.openxmlformats.org/officeDocument/2006/relationships" xmlns:p="http://schemas.openxmlformats.org/presentationml/2006/main">
+  <p:cSld>
+    <p:spTree>
+      <p:nvGrpSpPr>
+        <p:cNvPr id="1" name=""/>
+        <p:cNvGrpSpPr/>
+        <p:nvPr/>
+      </p:nvGrpSpPr>
+      <p:grpSpPr>
+        <a:xfrm>
+          <a:off x="0" y="0"/>
+          <a:ext cx="0" cy="0"/>
+          <a:chOff x="0" y="0"/>
+          <a:chExt cx="0" cy="0"/>
+        </a:xfrm>
+      </p:grpSpPr>
+      <p:sp>
+        <p:nvSpPr>
+          <p:cNvPr id="2" name="Slide Image Placeholder 1"/>
+          <p:cNvSpPr>
+            <a:spLocks noGrp="1" noRot="1" noChangeAspect="1"/>
+          </p:cNvSpPr>
+          <p:nvPr>
+            <p:ph type="sldImg"/>
+          </p:nvPr>
+        </p:nvSpPr>
+        <p:spPr/>
+      </p:sp>
+      <p:sp>
+        <p:nvSpPr>
+          <p:cNvPr id="3" name="Notes Placeholder 2"/>
+          <p:cNvSpPr>
+            <a:spLocks noGrp="1"/>
+          </p:cNvSpPr>
+          <p:nvPr>
+            <p:ph type="body" idx="1"/>
+          </p:nvPr>
+        </p:nvSpPr>
+        <p:spPr/>
+        <p:txBody>
+          <a:bodyPr/>
+          <a:lstStyle/>
+          <a:p>
+            <a:r>
+              <a:rPr lang="en-US" sz="1200" dirty="0"/>
+              <a:t>Hyperparameter Grid Search of tuning parameters. </a:t>
+            </a:r>
+            <a:r>
+              <a:rPr lang="en-US" dirty="0"/>
+              <a:t>We saw consistent results of 100% classification rates for oversampling in RFs and XGB for all combination of terms in grid search via MCMC methods (B=50). The two figures represent the ranking of best results from grid search for RF and XGB </a:t>
+            </a:r>
+            <a:r>
+              <a:rPr lang="en-US" dirty="0" err="1"/>
+              <a:t>undersampling</a:t>
+            </a:r>
+            <a:r>
+              <a:rPr lang="en-US" dirty="0"/>
+              <a:t>. RF had a maximal number of trees and small number of variables that were randomly selected. For XGB, the max depth was minimal and </a:t>
+            </a:r>
+            <a:r>
+              <a:rPr lang="en-US" dirty="0" err="1"/>
+              <a:t>nround</a:t>
+            </a:r>
+            <a:r>
+              <a:rPr lang="en-US" dirty="0"/>
+              <a:t> and </a:t>
+            </a:r>
+            <a:r>
+              <a:rPr lang="en-US" dirty="0" err="1"/>
+              <a:t>nthread</a:t>
+            </a:r>
+            <a:r>
+              <a:rPr lang="en-US" dirty="0"/>
+              <a:t> were maximal.</a:t>
+            </a:r>
+          </a:p>
+        </p:txBody>
+      </p:sp>
+      <p:sp>
+        <p:nvSpPr>
+          <p:cNvPr id="4" name="Slide Number Placeholder 3"/>
+          <p:cNvSpPr>
+            <a:spLocks noGrp="1"/>
+          </p:cNvSpPr>
+          <p:nvPr>
+            <p:ph type="sldNum" sz="quarter" idx="5"/>
+          </p:nvPr>
+        </p:nvSpPr>
+        <p:spPr/>
+        <p:txBody>
+          <a:bodyPr/>
+          <a:lstStyle/>
+          <a:p>
+            <a:fld id="{EED578F8-5C61-4F2D-A9E3-FDA016A0ABC4}" type="slidenum">
+              <a:rPr lang="en-US" smtClean="0"/>
+              <a:t>10</a:t>
+            </a:fld>
+            <a:endParaRPr lang="en-US"/>
+          </a:p>
+        </p:txBody>
+      </p:sp>
+    </p:spTree>
+    <p:extLst>
+      <p:ext uri="{BB962C8B-B14F-4D97-AF65-F5344CB8AC3E}">
+        <p14:creationId xmlns:p14="http://schemas.microsoft.com/office/powerpoint/2010/main" val="3289922974"/>
+      </p:ext>
+    </p:extLst>
+  </p:cSld>
+  <p:clrMapOvr>
+    <a:masterClrMapping/>
+  </p:clrMapOvr>
+</p:notes>
+</file>
+
+<file path=ppt/notesSlides/notesSlide5.xml><?xml version="1.0" encoding="utf-8"?>
+<p:notes xmlns:a="http://schemas.openxmlformats.org/drawingml/2006/main" xmlns:r="http://schemas.openxmlformats.org/officeDocument/2006/relationships" xmlns:p="http://schemas.openxmlformats.org/presentationml/2006/main">
+  <p:cSld>
+    <p:spTree>
+      <p:nvGrpSpPr>
+        <p:cNvPr id="1" name=""/>
+        <p:cNvGrpSpPr/>
+        <p:nvPr/>
+      </p:nvGrpSpPr>
+      <p:grpSpPr>
+        <a:xfrm>
+          <a:off x="0" y="0"/>
+          <a:ext cx="0" cy="0"/>
+          <a:chOff x="0" y="0"/>
+          <a:chExt cx="0" cy="0"/>
+        </a:xfrm>
+      </p:grpSpPr>
+      <p:sp>
+        <p:nvSpPr>
+          <p:cNvPr id="2" name="Slide Image Placeholder 1"/>
+          <p:cNvSpPr>
+            <a:spLocks noGrp="1" noRot="1" noChangeAspect="1"/>
+          </p:cNvSpPr>
+          <p:nvPr>
+            <p:ph type="sldImg"/>
+          </p:nvPr>
+        </p:nvSpPr>
+        <p:spPr/>
+      </p:sp>
+      <p:sp>
+        <p:nvSpPr>
+          <p:cNvPr id="3" name="Notes Placeholder 2"/>
+          <p:cNvSpPr>
+            <a:spLocks noGrp="1"/>
+          </p:cNvSpPr>
+          <p:nvPr>
+            <p:ph type="body" idx="1"/>
+          </p:nvPr>
+        </p:nvSpPr>
+        <p:spPr/>
+        <p:txBody>
+          <a:bodyPr/>
+          <a:lstStyle/>
+          <a:p>
+            <a:endParaRPr lang="en-US" dirty="0"/>
+          </a:p>
+        </p:txBody>
+      </p:sp>
+      <p:sp>
+        <p:nvSpPr>
+          <p:cNvPr id="4" name="Slide Number Placeholder 3"/>
+          <p:cNvSpPr>
+            <a:spLocks noGrp="1"/>
+          </p:cNvSpPr>
+          <p:nvPr>
+            <p:ph type="sldNum" sz="quarter" idx="5"/>
+          </p:nvPr>
+        </p:nvSpPr>
+        <p:spPr/>
+        <p:txBody>
+          <a:bodyPr/>
+          <a:lstStyle/>
+          <a:p>
+            <a:fld id="{EED578F8-5C61-4F2D-A9E3-FDA016A0ABC4}" type="slidenum">
+              <a:rPr lang="en-US" smtClean="0"/>
+              <a:t>11</a:t>
+            </a:fld>
+            <a:endParaRPr lang="en-US"/>
+          </a:p>
+        </p:txBody>
+      </p:sp>
+    </p:spTree>
+    <p:extLst>
+      <p:ext uri="{BB962C8B-B14F-4D97-AF65-F5344CB8AC3E}">
+        <p14:creationId xmlns:p14="http://schemas.microsoft.com/office/powerpoint/2010/main" val="448844499"/>
       </p:ext>
     </p:extLst>
   </p:cSld>
@@ -6823,6 +7107,14 @@
 <file path=ppt/slides/slide10.xml><?xml version="1.0" encoding="utf-8"?>
 <p:sld xmlns:a="http://schemas.openxmlformats.org/drawingml/2006/main" xmlns:r="http://schemas.openxmlformats.org/officeDocument/2006/relationships" xmlns:p="http://schemas.openxmlformats.org/presentationml/2006/main">
   <p:cSld>
+    <p:bg>
+      <p:bgPr>
+        <a:solidFill>
+          <a:schemeClr val="bg1"/>
+        </a:solidFill>
+        <a:effectLst/>
+      </p:bgPr>
+    </p:bg>
     <p:spTree>
       <p:nvGrpSpPr>
         <p:cNvPr id="1" name=""/>
@@ -6837,12 +7129,72 @@
           <a:chExt cx="0" cy="0"/>
         </a:xfrm>
       </p:grpSpPr>
+      <p:sp useBgFill="1">
+        <p:nvSpPr>
+          <p:cNvPr id="11" name="Rectangle 10">
+            <a:extLst>
+              <a:ext uri="{FF2B5EF4-FFF2-40B4-BE49-F238E27FC236}">
+                <a16:creationId xmlns:a16="http://schemas.microsoft.com/office/drawing/2014/main" id="{100EDD19-6802-4EC3-95CE-CFFAB042CFD6}"/>
+              </a:ext>
+              <a:ext uri="{C183D7F6-B498-43B3-948B-1728B52AA6E4}">
+                <adec:decorative xmlns:adec="http://schemas.microsoft.com/office/drawing/2017/decorative" val="1"/>
+              </a:ext>
+            </a:extLst>
+          </p:cNvPr>
+          <p:cNvSpPr>
+            <a:spLocks noGrp="1" noRot="1" noChangeAspect="1" noMove="1" noResize="1" noEditPoints="1" noAdjustHandles="1" noChangeArrowheads="1" noChangeShapeType="1" noTextEdit="1"/>
+          </p:cNvSpPr>
+          <p:nvPr>
+            <p:extLst>
+              <p:ext uri="{386F3935-93C4-4BCD-93E2-E3B085C9AB24}">
+                <p16:designElem xmlns:p16="http://schemas.microsoft.com/office/powerpoint/2015/main" val="1"/>
+              </p:ext>
+            </p:extLst>
+          </p:nvPr>
+        </p:nvSpPr>
+        <p:spPr>
+          <a:xfrm>
+            <a:off x="0" y="0"/>
+            <a:ext cx="12188952" cy="6858000"/>
+          </a:xfrm>
+          <a:prstGeom prst="rect">
+            <a:avLst/>
+          </a:prstGeom>
+          <a:ln>
+            <a:noFill/>
+          </a:ln>
+        </p:spPr>
+        <p:style>
+          <a:lnRef idx="2">
+            <a:schemeClr val="accent1">
+              <a:shade val="50000"/>
+            </a:schemeClr>
+          </a:lnRef>
+          <a:fillRef idx="1">
+            <a:schemeClr val="accent1"/>
+          </a:fillRef>
+          <a:effectRef idx="0">
+            <a:schemeClr val="accent1"/>
+          </a:effectRef>
+          <a:fontRef idx="minor">
+            <a:schemeClr val="lt1"/>
+          </a:fontRef>
+        </p:style>
+        <p:txBody>
+          <a:bodyPr rtlCol="0" anchor="ctr"/>
+          <a:lstStyle/>
+          <a:p>
+            <a:pPr algn="ctr"/>
+            <a:endParaRPr lang="en-US"/>
+          </a:p>
+        </p:txBody>
+      </p:sp>
       <p:sp>
         <p:nvSpPr>
           <p:cNvPr id="2" name="Title 1">
             <a:extLst>
               <a:ext uri="{FF2B5EF4-FFF2-40B4-BE49-F238E27FC236}">
-                <a16:creationId xmlns:a16="http://schemas.microsoft.com/office/drawing/2014/main" id="{D1CE59EB-9C7B-4817-8847-548C7EF9C039}"/>
+                <a16:creationId xmlns:a16="http://schemas.microsoft.com/office/drawing/2014/main" id="{EABAB166-3C39-43D1-8F8B-9DB2DEE2352F}"/>
               </a:ext>
             </a:extLst>
           </p:cNvPr>
@@ -6853,24 +7205,1500 @@
             <p:ph type="title"/>
           </p:nvPr>
         </p:nvSpPr>
-        <p:spPr/>
+        <p:spPr>
+          <a:xfrm>
+            <a:off x="838200" y="365125"/>
+            <a:ext cx="11099104" cy="1325563"/>
+          </a:xfrm>
+        </p:spPr>
         <p:txBody>
-          <a:bodyPr/>
+          <a:bodyPr>
+            <a:normAutofit/>
+          </a:bodyPr>
           <a:lstStyle/>
           <a:p>
             <a:r>
-              <a:rPr lang="en-US" dirty="0"/>
-              <a:t>Conclusion/Discussion (Sarah)</a:t>
+              <a:rPr lang="en-US" sz="5400" dirty="0"/>
+              <a:t>Results: Tuning Parameters</a:t>
             </a:r>
           </a:p>
         </p:txBody>
       </p:sp>
       <p:sp>
         <p:nvSpPr>
-          <p:cNvPr id="3" name="Content Placeholder 2">
+          <p:cNvPr id="13" name="sketch line">
             <a:extLst>
               <a:ext uri="{FF2B5EF4-FFF2-40B4-BE49-F238E27FC236}">
-                <a16:creationId xmlns:a16="http://schemas.microsoft.com/office/drawing/2014/main" id="{E3786C67-994A-4589-ADDB-56AAF1D98ED0}"/>
+                <a16:creationId xmlns:a16="http://schemas.microsoft.com/office/drawing/2014/main" id="{DB17E863-922E-4C26-BD64-E8FD41D28661}"/>
+              </a:ext>
+              <a:ext uri="{C183D7F6-B498-43B3-948B-1728B52AA6E4}">
+                <adec:decorative xmlns:adec="http://schemas.microsoft.com/office/drawing/2017/decorative" val="1"/>
+              </a:ext>
+            </a:extLst>
+          </p:cNvPr>
+          <p:cNvSpPr>
+            <a:spLocks noGrp="1" noRot="1" noChangeAspect="1" noMove="1" noResize="1" noEditPoints="1" noAdjustHandles="1" noChangeArrowheads="1" noChangeShapeType="1" noTextEdit="1"/>
+          </p:cNvSpPr>
+          <p:nvPr>
+            <p:extLst>
+              <p:ext uri="{386F3935-93C4-4BCD-93E2-E3B085C9AB24}">
+                <p16:designElem xmlns:p16="http://schemas.microsoft.com/office/powerpoint/2015/main" val="1"/>
+              </p:ext>
+            </p:extLst>
+          </p:nvPr>
+        </p:nvSpPr>
+        <p:spPr>
+          <a:xfrm>
+            <a:off x="669036" y="1677373"/>
+            <a:ext cx="10853928" cy="18288"/>
+          </a:xfrm>
+          <a:custGeom>
+            <a:avLst/>
+            <a:gdLst>
+              <a:gd name="connsiteX0" fmla="*/ 0 w 10853928"/>
+              <a:gd name="connsiteY0" fmla="*/ 0 h 18288"/>
+              <a:gd name="connsiteX1" fmla="*/ 461292 w 10853928"/>
+              <a:gd name="connsiteY1" fmla="*/ 0 h 18288"/>
+              <a:gd name="connsiteX2" fmla="*/ 1139662 w 10853928"/>
+              <a:gd name="connsiteY2" fmla="*/ 0 h 18288"/>
+              <a:gd name="connsiteX3" fmla="*/ 1926572 w 10853928"/>
+              <a:gd name="connsiteY3" fmla="*/ 0 h 18288"/>
+              <a:gd name="connsiteX4" fmla="*/ 2279325 w 10853928"/>
+              <a:gd name="connsiteY4" fmla="*/ 0 h 18288"/>
+              <a:gd name="connsiteX5" fmla="*/ 2632078 w 10853928"/>
+              <a:gd name="connsiteY5" fmla="*/ 0 h 18288"/>
+              <a:gd name="connsiteX6" fmla="*/ 3527527 w 10853928"/>
+              <a:gd name="connsiteY6" fmla="*/ 0 h 18288"/>
+              <a:gd name="connsiteX7" fmla="*/ 4205897 w 10853928"/>
+              <a:gd name="connsiteY7" fmla="*/ 0 h 18288"/>
+              <a:gd name="connsiteX8" fmla="*/ 4558650 w 10853928"/>
+              <a:gd name="connsiteY8" fmla="*/ 0 h 18288"/>
+              <a:gd name="connsiteX9" fmla="*/ 5237020 w 10853928"/>
+              <a:gd name="connsiteY9" fmla="*/ 0 h 18288"/>
+              <a:gd name="connsiteX10" fmla="*/ 6132469 w 10853928"/>
+              <a:gd name="connsiteY10" fmla="*/ 0 h 18288"/>
+              <a:gd name="connsiteX11" fmla="*/ 6702301 w 10853928"/>
+              <a:gd name="connsiteY11" fmla="*/ 0 h 18288"/>
+              <a:gd name="connsiteX12" fmla="*/ 7272132 w 10853928"/>
+              <a:gd name="connsiteY12" fmla="*/ 0 h 18288"/>
+              <a:gd name="connsiteX13" fmla="*/ 7950502 w 10853928"/>
+              <a:gd name="connsiteY13" fmla="*/ 0 h 18288"/>
+              <a:gd name="connsiteX14" fmla="*/ 8737412 w 10853928"/>
+              <a:gd name="connsiteY14" fmla="*/ 0 h 18288"/>
+              <a:gd name="connsiteX15" fmla="*/ 9524322 w 10853928"/>
+              <a:gd name="connsiteY15" fmla="*/ 0 h 18288"/>
+              <a:gd name="connsiteX16" fmla="*/ 10853928 w 10853928"/>
+              <a:gd name="connsiteY16" fmla="*/ 0 h 18288"/>
+              <a:gd name="connsiteX17" fmla="*/ 10853928 w 10853928"/>
+              <a:gd name="connsiteY17" fmla="*/ 18288 h 18288"/>
+              <a:gd name="connsiteX18" fmla="*/ 10392636 w 10853928"/>
+              <a:gd name="connsiteY18" fmla="*/ 18288 h 18288"/>
+              <a:gd name="connsiteX19" fmla="*/ 9497187 w 10853928"/>
+              <a:gd name="connsiteY19" fmla="*/ 18288 h 18288"/>
+              <a:gd name="connsiteX20" fmla="*/ 8818817 w 10853928"/>
+              <a:gd name="connsiteY20" fmla="*/ 18288 h 18288"/>
+              <a:gd name="connsiteX21" fmla="*/ 8466064 w 10853928"/>
+              <a:gd name="connsiteY21" fmla="*/ 18288 h 18288"/>
+              <a:gd name="connsiteX22" fmla="*/ 7787693 w 10853928"/>
+              <a:gd name="connsiteY22" fmla="*/ 18288 h 18288"/>
+              <a:gd name="connsiteX23" fmla="*/ 7217862 w 10853928"/>
+              <a:gd name="connsiteY23" fmla="*/ 18288 h 18288"/>
+              <a:gd name="connsiteX24" fmla="*/ 6648031 w 10853928"/>
+              <a:gd name="connsiteY24" fmla="*/ 18288 h 18288"/>
+              <a:gd name="connsiteX25" fmla="*/ 6078200 w 10853928"/>
+              <a:gd name="connsiteY25" fmla="*/ 18288 h 18288"/>
+              <a:gd name="connsiteX26" fmla="*/ 5508368 w 10853928"/>
+              <a:gd name="connsiteY26" fmla="*/ 18288 h 18288"/>
+              <a:gd name="connsiteX27" fmla="*/ 4721459 w 10853928"/>
+              <a:gd name="connsiteY27" fmla="*/ 18288 h 18288"/>
+              <a:gd name="connsiteX28" fmla="*/ 4043088 w 10853928"/>
+              <a:gd name="connsiteY28" fmla="*/ 18288 h 18288"/>
+              <a:gd name="connsiteX29" fmla="*/ 3690336 w 10853928"/>
+              <a:gd name="connsiteY29" fmla="*/ 18288 h 18288"/>
+              <a:gd name="connsiteX30" fmla="*/ 3120504 w 10853928"/>
+              <a:gd name="connsiteY30" fmla="*/ 18288 h 18288"/>
+              <a:gd name="connsiteX31" fmla="*/ 2333595 w 10853928"/>
+              <a:gd name="connsiteY31" fmla="*/ 18288 h 18288"/>
+              <a:gd name="connsiteX32" fmla="*/ 1872303 w 10853928"/>
+              <a:gd name="connsiteY32" fmla="*/ 18288 h 18288"/>
+              <a:gd name="connsiteX33" fmla="*/ 976854 w 10853928"/>
+              <a:gd name="connsiteY33" fmla="*/ 18288 h 18288"/>
+              <a:gd name="connsiteX34" fmla="*/ 0 w 10853928"/>
+              <a:gd name="connsiteY34" fmla="*/ 18288 h 18288"/>
+              <a:gd name="connsiteX35" fmla="*/ 0 w 10853928"/>
+              <a:gd name="connsiteY35" fmla="*/ 0 h 18288"/>
+            </a:gdLst>
+            <a:ahLst/>
+            <a:cxnLst>
+              <a:cxn ang="0">
+                <a:pos x="connsiteX0" y="connsiteY0"/>
+              </a:cxn>
+              <a:cxn ang="0">
+                <a:pos x="connsiteX1" y="connsiteY1"/>
+              </a:cxn>
+              <a:cxn ang="0">
+                <a:pos x="connsiteX2" y="connsiteY2"/>
+              </a:cxn>
+              <a:cxn ang="0">
+                <a:pos x="connsiteX3" y="connsiteY3"/>
+              </a:cxn>
+              <a:cxn ang="0">
+                <a:pos x="connsiteX4" y="connsiteY4"/>
+              </a:cxn>
+              <a:cxn ang="0">
+                <a:pos x="connsiteX5" y="connsiteY5"/>
+              </a:cxn>
+              <a:cxn ang="0">
+                <a:pos x="connsiteX6" y="connsiteY6"/>
+              </a:cxn>
+              <a:cxn ang="0">
+                <a:pos x="connsiteX7" y="connsiteY7"/>
+              </a:cxn>
+              <a:cxn ang="0">
+                <a:pos x="connsiteX8" y="connsiteY8"/>
+              </a:cxn>
+              <a:cxn ang="0">
+                <a:pos x="connsiteX9" y="connsiteY9"/>
+              </a:cxn>
+              <a:cxn ang="0">
+                <a:pos x="connsiteX10" y="connsiteY10"/>
+              </a:cxn>
+              <a:cxn ang="0">
+                <a:pos x="connsiteX11" y="connsiteY11"/>
+              </a:cxn>
+              <a:cxn ang="0">
+                <a:pos x="connsiteX12" y="connsiteY12"/>
+              </a:cxn>
+              <a:cxn ang="0">
+                <a:pos x="connsiteX13" y="connsiteY13"/>
+              </a:cxn>
+              <a:cxn ang="0">
+                <a:pos x="connsiteX14" y="connsiteY14"/>
+              </a:cxn>
+              <a:cxn ang="0">
+                <a:pos x="connsiteX15" y="connsiteY15"/>
+              </a:cxn>
+              <a:cxn ang="0">
+                <a:pos x="connsiteX16" y="connsiteY16"/>
+              </a:cxn>
+              <a:cxn ang="0">
+                <a:pos x="connsiteX17" y="connsiteY17"/>
+              </a:cxn>
+              <a:cxn ang="0">
+                <a:pos x="connsiteX18" y="connsiteY18"/>
+              </a:cxn>
+              <a:cxn ang="0">
+                <a:pos x="connsiteX19" y="connsiteY19"/>
+              </a:cxn>
+              <a:cxn ang="0">
+                <a:pos x="connsiteX20" y="connsiteY20"/>
+              </a:cxn>
+              <a:cxn ang="0">
+                <a:pos x="connsiteX21" y="connsiteY21"/>
+              </a:cxn>
+              <a:cxn ang="0">
+                <a:pos x="connsiteX22" y="connsiteY22"/>
+              </a:cxn>
+              <a:cxn ang="0">
+                <a:pos x="connsiteX23" y="connsiteY23"/>
+              </a:cxn>
+              <a:cxn ang="0">
+                <a:pos x="connsiteX24" y="connsiteY24"/>
+              </a:cxn>
+              <a:cxn ang="0">
+                <a:pos x="connsiteX25" y="connsiteY25"/>
+              </a:cxn>
+              <a:cxn ang="0">
+                <a:pos x="connsiteX26" y="connsiteY26"/>
+              </a:cxn>
+              <a:cxn ang="0">
+                <a:pos x="connsiteX27" y="connsiteY27"/>
+              </a:cxn>
+              <a:cxn ang="0">
+                <a:pos x="connsiteX28" y="connsiteY28"/>
+              </a:cxn>
+              <a:cxn ang="0">
+                <a:pos x="connsiteX29" y="connsiteY29"/>
+              </a:cxn>
+              <a:cxn ang="0">
+                <a:pos x="connsiteX30" y="connsiteY30"/>
+              </a:cxn>
+              <a:cxn ang="0">
+                <a:pos x="connsiteX31" y="connsiteY31"/>
+              </a:cxn>
+              <a:cxn ang="0">
+                <a:pos x="connsiteX32" y="connsiteY32"/>
+              </a:cxn>
+              <a:cxn ang="0">
+                <a:pos x="connsiteX33" y="connsiteY33"/>
+              </a:cxn>
+              <a:cxn ang="0">
+                <a:pos x="connsiteX34" y="connsiteY34"/>
+              </a:cxn>
+              <a:cxn ang="0">
+                <a:pos x="connsiteX35" y="connsiteY35"/>
+              </a:cxn>
+            </a:cxnLst>
+            <a:rect l="l" t="t" r="r" b="b"/>
+            <a:pathLst>
+              <a:path w="10853928" h="18288" fill="none" extrusionOk="0">
+                <a:moveTo>
+                  <a:pt x="0" y="0"/>
+                </a:moveTo>
+                <a:cubicBezTo>
+                  <a:pt x="146993" y="-19076"/>
+                  <a:pt x="347684" y="-4790"/>
+                  <a:pt x="461292" y="0"/>
+                </a:cubicBezTo>
+                <a:cubicBezTo>
+                  <a:pt x="574900" y="4790"/>
+                  <a:pt x="808367" y="19821"/>
+                  <a:pt x="1139662" y="0"/>
+                </a:cubicBezTo>
+                <a:cubicBezTo>
+                  <a:pt x="1470957" y="-19821"/>
+                  <a:pt x="1627405" y="5721"/>
+                  <a:pt x="1926572" y="0"/>
+                </a:cubicBezTo>
+                <a:cubicBezTo>
+                  <a:pt x="2225739" y="-5721"/>
+                  <a:pt x="2137730" y="-3235"/>
+                  <a:pt x="2279325" y="0"/>
+                </a:cubicBezTo>
+                <a:cubicBezTo>
+                  <a:pt x="2420920" y="3235"/>
+                  <a:pt x="2456518" y="9685"/>
+                  <a:pt x="2632078" y="0"/>
+                </a:cubicBezTo>
+                <a:cubicBezTo>
+                  <a:pt x="2807638" y="-9685"/>
+                  <a:pt x="3211516" y="-43007"/>
+                  <a:pt x="3527527" y="0"/>
+                </a:cubicBezTo>
+                <a:cubicBezTo>
+                  <a:pt x="3843538" y="43007"/>
+                  <a:pt x="4058833" y="22042"/>
+                  <a:pt x="4205897" y="0"/>
+                </a:cubicBezTo>
+                <a:cubicBezTo>
+                  <a:pt x="4352961" y="-22042"/>
+                  <a:pt x="4474805" y="-11846"/>
+                  <a:pt x="4558650" y="0"/>
+                </a:cubicBezTo>
+                <a:cubicBezTo>
+                  <a:pt x="4642495" y="11846"/>
+                  <a:pt x="5041928" y="-6069"/>
+                  <a:pt x="5237020" y="0"/>
+                </a:cubicBezTo>
+                <a:cubicBezTo>
+                  <a:pt x="5432112" y="6069"/>
+                  <a:pt x="5943266" y="-17479"/>
+                  <a:pt x="6132469" y="0"/>
+                </a:cubicBezTo>
+                <a:cubicBezTo>
+                  <a:pt x="6321672" y="17479"/>
+                  <a:pt x="6483872" y="26234"/>
+                  <a:pt x="6702301" y="0"/>
+                </a:cubicBezTo>
+                <a:cubicBezTo>
+                  <a:pt x="6920730" y="-26234"/>
+                  <a:pt x="6991194" y="-15156"/>
+                  <a:pt x="7272132" y="0"/>
+                </a:cubicBezTo>
+                <a:cubicBezTo>
+                  <a:pt x="7553070" y="15156"/>
+                  <a:pt x="7684444" y="-32961"/>
+                  <a:pt x="7950502" y="0"/>
+                </a:cubicBezTo>
+                <a:cubicBezTo>
+                  <a:pt x="8216560" y="32961"/>
+                  <a:pt x="8493290" y="-10491"/>
+                  <a:pt x="8737412" y="0"/>
+                </a:cubicBezTo>
+                <a:cubicBezTo>
+                  <a:pt x="8981534" y="10491"/>
+                  <a:pt x="9191586" y="-13899"/>
+                  <a:pt x="9524322" y="0"/>
+                </a:cubicBezTo>
+                <a:cubicBezTo>
+                  <a:pt x="9857058" y="13899"/>
+                  <a:pt x="10297509" y="7485"/>
+                  <a:pt x="10853928" y="0"/>
+                </a:cubicBezTo>
+                <a:cubicBezTo>
+                  <a:pt x="10854574" y="4451"/>
+                  <a:pt x="10854418" y="9226"/>
+                  <a:pt x="10853928" y="18288"/>
+                </a:cubicBezTo>
+                <a:cubicBezTo>
+                  <a:pt x="10691638" y="28522"/>
+                  <a:pt x="10574319" y="29578"/>
+                  <a:pt x="10392636" y="18288"/>
+                </a:cubicBezTo>
+                <a:cubicBezTo>
+                  <a:pt x="10210953" y="6998"/>
+                  <a:pt x="9836277" y="-16742"/>
+                  <a:pt x="9497187" y="18288"/>
+                </a:cubicBezTo>
+                <a:cubicBezTo>
+                  <a:pt x="9158097" y="53318"/>
+                  <a:pt x="9119479" y="30714"/>
+                  <a:pt x="8818817" y="18288"/>
+                </a:cubicBezTo>
+                <a:cubicBezTo>
+                  <a:pt x="8518155" y="5863"/>
+                  <a:pt x="8640037" y="6483"/>
+                  <a:pt x="8466064" y="18288"/>
+                </a:cubicBezTo>
+                <a:cubicBezTo>
+                  <a:pt x="8292091" y="30093"/>
+                  <a:pt x="7997656" y="18914"/>
+                  <a:pt x="7787693" y="18288"/>
+                </a:cubicBezTo>
+                <a:cubicBezTo>
+                  <a:pt x="7577730" y="17662"/>
+                  <a:pt x="7412468" y="21416"/>
+                  <a:pt x="7217862" y="18288"/>
+                </a:cubicBezTo>
+                <a:cubicBezTo>
+                  <a:pt x="7023256" y="15160"/>
+                  <a:pt x="6898018" y="14824"/>
+                  <a:pt x="6648031" y="18288"/>
+                </a:cubicBezTo>
+                <a:cubicBezTo>
+                  <a:pt x="6398044" y="21752"/>
+                  <a:pt x="6254402" y="38625"/>
+                  <a:pt x="6078200" y="18288"/>
+                </a:cubicBezTo>
+                <a:cubicBezTo>
+                  <a:pt x="5901998" y="-2049"/>
+                  <a:pt x="5622886" y="3213"/>
+                  <a:pt x="5508368" y="18288"/>
+                </a:cubicBezTo>
+                <a:cubicBezTo>
+                  <a:pt x="5393850" y="33363"/>
+                  <a:pt x="5036260" y="26830"/>
+                  <a:pt x="4721459" y="18288"/>
+                </a:cubicBezTo>
+                <a:cubicBezTo>
+                  <a:pt x="4406658" y="9746"/>
+                  <a:pt x="4239221" y="41551"/>
+                  <a:pt x="4043088" y="18288"/>
+                </a:cubicBezTo>
+                <a:cubicBezTo>
+                  <a:pt x="3846955" y="-4975"/>
+                  <a:pt x="3818802" y="34658"/>
+                  <a:pt x="3690336" y="18288"/>
+                </a:cubicBezTo>
+                <a:cubicBezTo>
+                  <a:pt x="3561870" y="1918"/>
+                  <a:pt x="3265491" y="42194"/>
+                  <a:pt x="3120504" y="18288"/>
+                </a:cubicBezTo>
+                <a:cubicBezTo>
+                  <a:pt x="2975517" y="-5618"/>
+                  <a:pt x="2720254" y="36673"/>
+                  <a:pt x="2333595" y="18288"/>
+                </a:cubicBezTo>
+                <a:cubicBezTo>
+                  <a:pt x="1946936" y="-97"/>
+                  <a:pt x="2097241" y="5776"/>
+                  <a:pt x="1872303" y="18288"/>
+                </a:cubicBezTo>
+                <a:cubicBezTo>
+                  <a:pt x="1647365" y="30800"/>
+                  <a:pt x="1282708" y="45380"/>
+                  <a:pt x="976854" y="18288"/>
+                </a:cubicBezTo>
+                <a:cubicBezTo>
+                  <a:pt x="671000" y="-8804"/>
+                  <a:pt x="408401" y="-12775"/>
+                  <a:pt x="0" y="18288"/>
+                </a:cubicBezTo>
+                <a:cubicBezTo>
+                  <a:pt x="-213" y="9468"/>
+                  <a:pt x="187" y="4459"/>
+                  <a:pt x="0" y="0"/>
+                </a:cubicBezTo>
+                <a:close/>
+              </a:path>
+              <a:path w="10853928" h="18288" stroke="0" extrusionOk="0">
+                <a:moveTo>
+                  <a:pt x="0" y="0"/>
+                </a:moveTo>
+                <a:cubicBezTo>
+                  <a:pt x="267322" y="15284"/>
+                  <a:pt x="415388" y="-21048"/>
+                  <a:pt x="569831" y="0"/>
+                </a:cubicBezTo>
+                <a:cubicBezTo>
+                  <a:pt x="724274" y="21048"/>
+                  <a:pt x="769333" y="-2353"/>
+                  <a:pt x="922584" y="0"/>
+                </a:cubicBezTo>
+                <a:cubicBezTo>
+                  <a:pt x="1075835" y="2353"/>
+                  <a:pt x="1399490" y="-145"/>
+                  <a:pt x="1818033" y="0"/>
+                </a:cubicBezTo>
+                <a:cubicBezTo>
+                  <a:pt x="2236576" y="145"/>
+                  <a:pt x="2145330" y="5482"/>
+                  <a:pt x="2387864" y="0"/>
+                </a:cubicBezTo>
+                <a:cubicBezTo>
+                  <a:pt x="2630398" y="-5482"/>
+                  <a:pt x="2793207" y="18487"/>
+                  <a:pt x="2957695" y="0"/>
+                </a:cubicBezTo>
+                <a:cubicBezTo>
+                  <a:pt x="3122183" y="-18487"/>
+                  <a:pt x="3579141" y="19003"/>
+                  <a:pt x="3853144" y="0"/>
+                </a:cubicBezTo>
+                <a:cubicBezTo>
+                  <a:pt x="4127147" y="-19003"/>
+                  <a:pt x="4209857" y="12211"/>
+                  <a:pt x="4314436" y="0"/>
+                </a:cubicBezTo>
+                <a:cubicBezTo>
+                  <a:pt x="4419015" y="-12211"/>
+                  <a:pt x="4762459" y="-17220"/>
+                  <a:pt x="5209885" y="0"/>
+                </a:cubicBezTo>
+                <a:cubicBezTo>
+                  <a:pt x="5657311" y="17220"/>
+                  <a:pt x="5692663" y="-3290"/>
+                  <a:pt x="6105335" y="0"/>
+                </a:cubicBezTo>
+                <a:cubicBezTo>
+                  <a:pt x="6518007" y="3290"/>
+                  <a:pt x="6455516" y="-5124"/>
+                  <a:pt x="6783705" y="0"/>
+                </a:cubicBezTo>
+                <a:cubicBezTo>
+                  <a:pt x="7111894" y="5124"/>
+                  <a:pt x="7441941" y="-17829"/>
+                  <a:pt x="7679154" y="0"/>
+                </a:cubicBezTo>
+                <a:cubicBezTo>
+                  <a:pt x="7916367" y="17829"/>
+                  <a:pt x="8102967" y="-24363"/>
+                  <a:pt x="8248985" y="0"/>
+                </a:cubicBezTo>
+                <a:cubicBezTo>
+                  <a:pt x="8395003" y="24363"/>
+                  <a:pt x="8552393" y="25505"/>
+                  <a:pt x="8818817" y="0"/>
+                </a:cubicBezTo>
+                <a:cubicBezTo>
+                  <a:pt x="9085241" y="-25505"/>
+                  <a:pt x="9411308" y="38000"/>
+                  <a:pt x="9605726" y="0"/>
+                </a:cubicBezTo>
+                <a:cubicBezTo>
+                  <a:pt x="9800144" y="-38000"/>
+                  <a:pt x="10006468" y="-25741"/>
+                  <a:pt x="10175558" y="0"/>
+                </a:cubicBezTo>
+                <a:cubicBezTo>
+                  <a:pt x="10344648" y="25741"/>
+                  <a:pt x="10696282" y="695"/>
+                  <a:pt x="10853928" y="0"/>
+                </a:cubicBezTo>
+                <a:cubicBezTo>
+                  <a:pt x="10853521" y="8690"/>
+                  <a:pt x="10853774" y="14141"/>
+                  <a:pt x="10853928" y="18288"/>
+                </a:cubicBezTo>
+                <a:cubicBezTo>
+                  <a:pt x="10608124" y="24255"/>
+                  <a:pt x="10343415" y="22307"/>
+                  <a:pt x="10067018" y="18288"/>
+                </a:cubicBezTo>
+                <a:cubicBezTo>
+                  <a:pt x="9790621" y="14270"/>
+                  <a:pt x="9843266" y="3564"/>
+                  <a:pt x="9714266" y="18288"/>
+                </a:cubicBezTo>
+                <a:cubicBezTo>
+                  <a:pt x="9585266" y="33012"/>
+                  <a:pt x="9379484" y="1875"/>
+                  <a:pt x="9252974" y="18288"/>
+                </a:cubicBezTo>
+                <a:cubicBezTo>
+                  <a:pt x="9126464" y="34701"/>
+                  <a:pt x="8580678" y="-4904"/>
+                  <a:pt x="8357525" y="18288"/>
+                </a:cubicBezTo>
+                <a:cubicBezTo>
+                  <a:pt x="8134372" y="41480"/>
+                  <a:pt x="7903199" y="26458"/>
+                  <a:pt x="7679154" y="18288"/>
+                </a:cubicBezTo>
+                <a:cubicBezTo>
+                  <a:pt x="7455109" y="10118"/>
+                  <a:pt x="7435944" y="27109"/>
+                  <a:pt x="7217862" y="18288"/>
+                </a:cubicBezTo>
+                <a:cubicBezTo>
+                  <a:pt x="6999780" y="9467"/>
+                  <a:pt x="6680409" y="18985"/>
+                  <a:pt x="6539492" y="18288"/>
+                </a:cubicBezTo>
+                <a:cubicBezTo>
+                  <a:pt x="6398575" y="17592"/>
+                  <a:pt x="6312077" y="33018"/>
+                  <a:pt x="6186739" y="18288"/>
+                </a:cubicBezTo>
+                <a:cubicBezTo>
+                  <a:pt x="6061401" y="3558"/>
+                  <a:pt x="5947033" y="12075"/>
+                  <a:pt x="5833986" y="18288"/>
+                </a:cubicBezTo>
+                <a:cubicBezTo>
+                  <a:pt x="5720939" y="24501"/>
+                  <a:pt x="5482226" y="8586"/>
+                  <a:pt x="5155616" y="18288"/>
+                </a:cubicBezTo>
+                <a:cubicBezTo>
+                  <a:pt x="4829006" y="27991"/>
+                  <a:pt x="4841274" y="29316"/>
+                  <a:pt x="4694324" y="18288"/>
+                </a:cubicBezTo>
+                <a:cubicBezTo>
+                  <a:pt x="4547374" y="7260"/>
+                  <a:pt x="4077675" y="7013"/>
+                  <a:pt x="3907414" y="18288"/>
+                </a:cubicBezTo>
+                <a:cubicBezTo>
+                  <a:pt x="3737153" y="29564"/>
+                  <a:pt x="3538393" y="21630"/>
+                  <a:pt x="3446122" y="18288"/>
+                </a:cubicBezTo>
+                <a:cubicBezTo>
+                  <a:pt x="3353851" y="14946"/>
+                  <a:pt x="2990320" y="-8091"/>
+                  <a:pt x="2659212" y="18288"/>
+                </a:cubicBezTo>
+                <a:cubicBezTo>
+                  <a:pt x="2328104" y="44667"/>
+                  <a:pt x="2427653" y="9607"/>
+                  <a:pt x="2306460" y="18288"/>
+                </a:cubicBezTo>
+                <a:cubicBezTo>
+                  <a:pt x="2185267" y="26969"/>
+                  <a:pt x="1719763" y="3717"/>
+                  <a:pt x="1519550" y="18288"/>
+                </a:cubicBezTo>
+                <a:cubicBezTo>
+                  <a:pt x="1319337" y="32860"/>
+                  <a:pt x="1167371" y="17040"/>
+                  <a:pt x="1058258" y="18288"/>
+                </a:cubicBezTo>
+                <a:cubicBezTo>
+                  <a:pt x="949145" y="19536"/>
+                  <a:pt x="780234" y="31447"/>
+                  <a:pt x="705505" y="18288"/>
+                </a:cubicBezTo>
+                <a:cubicBezTo>
+                  <a:pt x="630776" y="5129"/>
+                  <a:pt x="215796" y="30056"/>
+                  <a:pt x="0" y="18288"/>
+                </a:cubicBezTo>
+                <a:cubicBezTo>
+                  <a:pt x="-53" y="11301"/>
+                  <a:pt x="-649" y="7756"/>
+                  <a:pt x="0" y="0"/>
+                </a:cubicBezTo>
+                <a:close/>
+              </a:path>
+            </a:pathLst>
+          </a:custGeom>
+          <a:solidFill>
+            <a:schemeClr val="accent2"/>
+          </a:solidFill>
+          <a:ln w="41275" cap="rnd">
+            <a:solidFill>
+              <a:schemeClr val="accent2"/>
+            </a:solidFill>
+            <a:round/>
+            <a:extLst>
+              <a:ext uri="{C807C97D-BFC1-408E-A445-0C87EB9F89A2}">
+                <ask:lineSketchStyleProps xmlns:ask="http://schemas.microsoft.com/office/drawing/2018/sketchyshapes" sd="1219033472">
+                  <a:prstGeom prst="rect">
+                    <a:avLst/>
+                  </a:prstGeom>
+                  <ask:type>
+                    <ask:lineSketchFreehand/>
+                  </ask:type>
+                </ask:lineSketchStyleProps>
+              </a:ext>
+            </a:extLst>
+          </a:ln>
+        </p:spPr>
+        <p:style>
+          <a:lnRef idx="2">
+            <a:schemeClr val="accent1">
+              <a:shade val="50000"/>
+            </a:schemeClr>
+          </a:lnRef>
+          <a:fillRef idx="1">
+            <a:schemeClr val="accent1"/>
+          </a:fillRef>
+          <a:effectRef idx="0">
+            <a:schemeClr val="accent1"/>
+          </a:effectRef>
+          <a:fontRef idx="minor">
+            <a:schemeClr val="lt1"/>
+          </a:fontRef>
+        </p:style>
+        <p:txBody>
+          <a:bodyPr rtlCol="0" anchor="ctr"/>
+          <a:lstStyle/>
+          <a:p>
+            <a:pPr algn="ctr"/>
+            <a:endParaRPr lang="en-US"/>
+          </a:p>
+        </p:txBody>
+      </p:sp>
+      <p:pic>
+        <p:nvPicPr>
+          <p:cNvPr id="7" name="Picture 6">
+            <a:extLst>
+              <a:ext uri="{FF2B5EF4-FFF2-40B4-BE49-F238E27FC236}">
+                <a16:creationId xmlns:a16="http://schemas.microsoft.com/office/drawing/2014/main" id="{FB3E44ED-3298-4163-8692-B08E68381CEC}"/>
+              </a:ext>
+            </a:extLst>
+          </p:cNvPr>
+          <p:cNvPicPr>
+            <a:picLocks noChangeAspect="1"/>
+          </p:cNvPicPr>
+          <p:nvPr/>
+        </p:nvPicPr>
+        <p:blipFill>
+          <a:blip r:embed="rId3"/>
+          <a:stretch>
+            <a:fillRect/>
+          </a:stretch>
+        </p:blipFill>
+        <p:spPr>
+          <a:xfrm>
+            <a:off x="2886076" y="1812226"/>
+            <a:ext cx="7524750" cy="2272967"/>
+          </a:xfrm>
+          <a:prstGeom prst="rect">
+            <a:avLst/>
+          </a:prstGeom>
+        </p:spPr>
+      </p:pic>
+      <p:pic>
+        <p:nvPicPr>
+          <p:cNvPr id="14" name="Picture 13">
+            <a:extLst>
+              <a:ext uri="{FF2B5EF4-FFF2-40B4-BE49-F238E27FC236}">
+                <a16:creationId xmlns:a16="http://schemas.microsoft.com/office/drawing/2014/main" id="{729517C9-E12B-4FDD-B8E5-671D9AE8ACF7}"/>
+              </a:ext>
+            </a:extLst>
+          </p:cNvPr>
+          <p:cNvPicPr>
+            <a:picLocks noChangeAspect="1"/>
+          </p:cNvPicPr>
+          <p:nvPr/>
+        </p:nvPicPr>
+        <p:blipFill>
+          <a:blip r:embed="rId4"/>
+          <a:stretch>
+            <a:fillRect/>
+          </a:stretch>
+        </p:blipFill>
+        <p:spPr>
+          <a:xfrm>
+            <a:off x="2403539" y="4334225"/>
+            <a:ext cx="8245412" cy="2374405"/>
+          </a:xfrm>
+          <a:prstGeom prst="rect">
+            <a:avLst/>
+          </a:prstGeom>
+        </p:spPr>
+      </p:pic>
+    </p:spTree>
+    <p:extLst>
+      <p:ext uri="{BB962C8B-B14F-4D97-AF65-F5344CB8AC3E}">
+        <p14:creationId xmlns:p14="http://schemas.microsoft.com/office/powerpoint/2010/main" val="3198314860"/>
+      </p:ext>
+    </p:extLst>
+  </p:cSld>
+  <p:clrMapOvr>
+    <a:masterClrMapping/>
+  </p:clrMapOvr>
+</p:sld>
+</file>
+
+<file path=ppt/slides/slide11.xml><?xml version="1.0" encoding="utf-8"?>
+<p:sld xmlns:a="http://schemas.openxmlformats.org/drawingml/2006/main" xmlns:r="http://schemas.openxmlformats.org/officeDocument/2006/relationships" xmlns:p="http://schemas.openxmlformats.org/presentationml/2006/main">
+  <p:cSld>
+    <p:bg>
+      <p:bgPr>
+        <a:solidFill>
+          <a:schemeClr val="bg1"/>
+        </a:solidFill>
+        <a:effectLst/>
+      </p:bgPr>
+    </p:bg>
+    <p:spTree>
+      <p:nvGrpSpPr>
+        <p:cNvPr id="1" name=""/>
+        <p:cNvGrpSpPr/>
+        <p:nvPr/>
+      </p:nvGrpSpPr>
+      <p:grpSpPr>
+        <a:xfrm>
+          <a:off x="0" y="0"/>
+          <a:ext cx="0" cy="0"/>
+          <a:chOff x="0" y="0"/>
+          <a:chExt cx="0" cy="0"/>
+        </a:xfrm>
+      </p:grpSpPr>
+      <p:sp useBgFill="1">
+        <p:nvSpPr>
+          <p:cNvPr id="11" name="Rectangle 10">
+            <a:extLst>
+              <a:ext uri="{FF2B5EF4-FFF2-40B4-BE49-F238E27FC236}">
+                <a16:creationId xmlns:a16="http://schemas.microsoft.com/office/drawing/2014/main" id="{100EDD19-6802-4EC3-95CE-CFFAB042CFD6}"/>
+              </a:ext>
+              <a:ext uri="{C183D7F6-B498-43B3-948B-1728B52AA6E4}">
+                <adec:decorative xmlns:adec="http://schemas.microsoft.com/office/drawing/2017/decorative" val="1"/>
+              </a:ext>
+            </a:extLst>
+          </p:cNvPr>
+          <p:cNvSpPr>
+            <a:spLocks noGrp="1" noRot="1" noChangeAspect="1" noMove="1" noResize="1" noEditPoints="1" noAdjustHandles="1" noChangeArrowheads="1" noChangeShapeType="1" noTextEdit="1"/>
+          </p:cNvSpPr>
+          <p:nvPr>
+            <p:extLst>
+              <p:ext uri="{386F3935-93C4-4BCD-93E2-E3B085C9AB24}">
+                <p16:designElem xmlns:p16="http://schemas.microsoft.com/office/powerpoint/2015/main" val="1"/>
+              </p:ext>
+            </p:extLst>
+          </p:nvPr>
+        </p:nvSpPr>
+        <p:spPr>
+          <a:xfrm>
+            <a:off x="0" y="0"/>
+            <a:ext cx="12188952" cy="6858000"/>
+          </a:xfrm>
+          <a:prstGeom prst="rect">
+            <a:avLst/>
+          </a:prstGeom>
+          <a:ln>
+            <a:noFill/>
+          </a:ln>
+        </p:spPr>
+        <p:style>
+          <a:lnRef idx="2">
+            <a:schemeClr val="accent1">
+              <a:shade val="50000"/>
+            </a:schemeClr>
+          </a:lnRef>
+          <a:fillRef idx="1">
+            <a:schemeClr val="accent1"/>
+          </a:fillRef>
+          <a:effectRef idx="0">
+            <a:schemeClr val="accent1"/>
+          </a:effectRef>
+          <a:fontRef idx="minor">
+            <a:schemeClr val="lt1"/>
+          </a:fontRef>
+        </p:style>
+        <p:txBody>
+          <a:bodyPr rtlCol="0" anchor="ctr"/>
+          <a:lstStyle/>
+          <a:p>
+            <a:pPr algn="ctr"/>
+            <a:endParaRPr lang="en-US"/>
+          </a:p>
+        </p:txBody>
+      </p:sp>
+      <p:sp>
+        <p:nvSpPr>
+          <p:cNvPr id="2" name="Title 1">
+            <a:extLst>
+              <a:ext uri="{FF2B5EF4-FFF2-40B4-BE49-F238E27FC236}">
+                <a16:creationId xmlns:a16="http://schemas.microsoft.com/office/drawing/2014/main" id="{EABAB166-3C39-43D1-8F8B-9DB2DEE2352F}"/>
+              </a:ext>
+            </a:extLst>
+          </p:cNvPr>
+          <p:cNvSpPr>
+            <a:spLocks noGrp="1"/>
+          </p:cNvSpPr>
+          <p:nvPr>
+            <p:ph type="title"/>
+          </p:nvPr>
+        </p:nvSpPr>
+        <p:spPr>
+          <a:xfrm>
+            <a:off x="838200" y="365125"/>
+            <a:ext cx="10515600" cy="1325563"/>
+          </a:xfrm>
+        </p:spPr>
+        <p:txBody>
+          <a:bodyPr>
+            <a:normAutofit/>
+          </a:bodyPr>
+          <a:lstStyle/>
+          <a:p>
+            <a:r>
+              <a:rPr lang="en-US" sz="5400" dirty="0"/>
+              <a:t>Discussion and Conclusion</a:t>
+            </a:r>
+          </a:p>
+        </p:txBody>
+      </p:sp>
+      <p:sp>
+        <p:nvSpPr>
+          <p:cNvPr id="13" name="sketch line">
+            <a:extLst>
+              <a:ext uri="{FF2B5EF4-FFF2-40B4-BE49-F238E27FC236}">
+                <a16:creationId xmlns:a16="http://schemas.microsoft.com/office/drawing/2014/main" id="{DB17E863-922E-4C26-BD64-E8FD41D28661}"/>
+              </a:ext>
+              <a:ext uri="{C183D7F6-B498-43B3-948B-1728B52AA6E4}">
+                <adec:decorative xmlns:adec="http://schemas.microsoft.com/office/drawing/2017/decorative" val="1"/>
+              </a:ext>
+            </a:extLst>
+          </p:cNvPr>
+          <p:cNvSpPr>
+            <a:spLocks noGrp="1" noRot="1" noChangeAspect="1" noMove="1" noResize="1" noEditPoints="1" noAdjustHandles="1" noChangeArrowheads="1" noChangeShapeType="1" noTextEdit="1"/>
+          </p:cNvSpPr>
+          <p:nvPr>
+            <p:extLst>
+              <p:ext uri="{386F3935-93C4-4BCD-93E2-E3B085C9AB24}">
+                <p16:designElem xmlns:p16="http://schemas.microsoft.com/office/powerpoint/2015/main" val="1"/>
+              </p:ext>
+            </p:extLst>
+          </p:nvPr>
+        </p:nvSpPr>
+        <p:spPr>
+          <a:xfrm>
+            <a:off x="669036" y="1677373"/>
+            <a:ext cx="10853928" cy="18288"/>
+          </a:xfrm>
+          <a:custGeom>
+            <a:avLst/>
+            <a:gdLst>
+              <a:gd name="connsiteX0" fmla="*/ 0 w 10853928"/>
+              <a:gd name="connsiteY0" fmla="*/ 0 h 18288"/>
+              <a:gd name="connsiteX1" fmla="*/ 461292 w 10853928"/>
+              <a:gd name="connsiteY1" fmla="*/ 0 h 18288"/>
+              <a:gd name="connsiteX2" fmla="*/ 1139662 w 10853928"/>
+              <a:gd name="connsiteY2" fmla="*/ 0 h 18288"/>
+              <a:gd name="connsiteX3" fmla="*/ 1926572 w 10853928"/>
+              <a:gd name="connsiteY3" fmla="*/ 0 h 18288"/>
+              <a:gd name="connsiteX4" fmla="*/ 2279325 w 10853928"/>
+              <a:gd name="connsiteY4" fmla="*/ 0 h 18288"/>
+              <a:gd name="connsiteX5" fmla="*/ 2632078 w 10853928"/>
+              <a:gd name="connsiteY5" fmla="*/ 0 h 18288"/>
+              <a:gd name="connsiteX6" fmla="*/ 3527527 w 10853928"/>
+              <a:gd name="connsiteY6" fmla="*/ 0 h 18288"/>
+              <a:gd name="connsiteX7" fmla="*/ 4205897 w 10853928"/>
+              <a:gd name="connsiteY7" fmla="*/ 0 h 18288"/>
+              <a:gd name="connsiteX8" fmla="*/ 4558650 w 10853928"/>
+              <a:gd name="connsiteY8" fmla="*/ 0 h 18288"/>
+              <a:gd name="connsiteX9" fmla="*/ 5237020 w 10853928"/>
+              <a:gd name="connsiteY9" fmla="*/ 0 h 18288"/>
+              <a:gd name="connsiteX10" fmla="*/ 6132469 w 10853928"/>
+              <a:gd name="connsiteY10" fmla="*/ 0 h 18288"/>
+              <a:gd name="connsiteX11" fmla="*/ 6702301 w 10853928"/>
+              <a:gd name="connsiteY11" fmla="*/ 0 h 18288"/>
+              <a:gd name="connsiteX12" fmla="*/ 7272132 w 10853928"/>
+              <a:gd name="connsiteY12" fmla="*/ 0 h 18288"/>
+              <a:gd name="connsiteX13" fmla="*/ 7950502 w 10853928"/>
+              <a:gd name="connsiteY13" fmla="*/ 0 h 18288"/>
+              <a:gd name="connsiteX14" fmla="*/ 8737412 w 10853928"/>
+              <a:gd name="connsiteY14" fmla="*/ 0 h 18288"/>
+              <a:gd name="connsiteX15" fmla="*/ 9524322 w 10853928"/>
+              <a:gd name="connsiteY15" fmla="*/ 0 h 18288"/>
+              <a:gd name="connsiteX16" fmla="*/ 10853928 w 10853928"/>
+              <a:gd name="connsiteY16" fmla="*/ 0 h 18288"/>
+              <a:gd name="connsiteX17" fmla="*/ 10853928 w 10853928"/>
+              <a:gd name="connsiteY17" fmla="*/ 18288 h 18288"/>
+              <a:gd name="connsiteX18" fmla="*/ 10392636 w 10853928"/>
+              <a:gd name="connsiteY18" fmla="*/ 18288 h 18288"/>
+              <a:gd name="connsiteX19" fmla="*/ 9497187 w 10853928"/>
+              <a:gd name="connsiteY19" fmla="*/ 18288 h 18288"/>
+              <a:gd name="connsiteX20" fmla="*/ 8818817 w 10853928"/>
+              <a:gd name="connsiteY20" fmla="*/ 18288 h 18288"/>
+              <a:gd name="connsiteX21" fmla="*/ 8466064 w 10853928"/>
+              <a:gd name="connsiteY21" fmla="*/ 18288 h 18288"/>
+              <a:gd name="connsiteX22" fmla="*/ 7787693 w 10853928"/>
+              <a:gd name="connsiteY22" fmla="*/ 18288 h 18288"/>
+              <a:gd name="connsiteX23" fmla="*/ 7217862 w 10853928"/>
+              <a:gd name="connsiteY23" fmla="*/ 18288 h 18288"/>
+              <a:gd name="connsiteX24" fmla="*/ 6648031 w 10853928"/>
+              <a:gd name="connsiteY24" fmla="*/ 18288 h 18288"/>
+              <a:gd name="connsiteX25" fmla="*/ 6078200 w 10853928"/>
+              <a:gd name="connsiteY25" fmla="*/ 18288 h 18288"/>
+              <a:gd name="connsiteX26" fmla="*/ 5508368 w 10853928"/>
+              <a:gd name="connsiteY26" fmla="*/ 18288 h 18288"/>
+              <a:gd name="connsiteX27" fmla="*/ 4721459 w 10853928"/>
+              <a:gd name="connsiteY27" fmla="*/ 18288 h 18288"/>
+              <a:gd name="connsiteX28" fmla="*/ 4043088 w 10853928"/>
+              <a:gd name="connsiteY28" fmla="*/ 18288 h 18288"/>
+              <a:gd name="connsiteX29" fmla="*/ 3690336 w 10853928"/>
+              <a:gd name="connsiteY29" fmla="*/ 18288 h 18288"/>
+              <a:gd name="connsiteX30" fmla="*/ 3120504 w 10853928"/>
+              <a:gd name="connsiteY30" fmla="*/ 18288 h 18288"/>
+              <a:gd name="connsiteX31" fmla="*/ 2333595 w 10853928"/>
+              <a:gd name="connsiteY31" fmla="*/ 18288 h 18288"/>
+              <a:gd name="connsiteX32" fmla="*/ 1872303 w 10853928"/>
+              <a:gd name="connsiteY32" fmla="*/ 18288 h 18288"/>
+              <a:gd name="connsiteX33" fmla="*/ 976854 w 10853928"/>
+              <a:gd name="connsiteY33" fmla="*/ 18288 h 18288"/>
+              <a:gd name="connsiteX34" fmla="*/ 0 w 10853928"/>
+              <a:gd name="connsiteY34" fmla="*/ 18288 h 18288"/>
+              <a:gd name="connsiteX35" fmla="*/ 0 w 10853928"/>
+              <a:gd name="connsiteY35" fmla="*/ 0 h 18288"/>
+            </a:gdLst>
+            <a:ahLst/>
+            <a:cxnLst>
+              <a:cxn ang="0">
+                <a:pos x="connsiteX0" y="connsiteY0"/>
+              </a:cxn>
+              <a:cxn ang="0">
+                <a:pos x="connsiteX1" y="connsiteY1"/>
+              </a:cxn>
+              <a:cxn ang="0">
+                <a:pos x="connsiteX2" y="connsiteY2"/>
+              </a:cxn>
+              <a:cxn ang="0">
+                <a:pos x="connsiteX3" y="connsiteY3"/>
+              </a:cxn>
+              <a:cxn ang="0">
+                <a:pos x="connsiteX4" y="connsiteY4"/>
+              </a:cxn>
+              <a:cxn ang="0">
+                <a:pos x="connsiteX5" y="connsiteY5"/>
+              </a:cxn>
+              <a:cxn ang="0">
+                <a:pos x="connsiteX6" y="connsiteY6"/>
+              </a:cxn>
+              <a:cxn ang="0">
+                <a:pos x="connsiteX7" y="connsiteY7"/>
+              </a:cxn>
+              <a:cxn ang="0">
+                <a:pos x="connsiteX8" y="connsiteY8"/>
+              </a:cxn>
+              <a:cxn ang="0">
+                <a:pos x="connsiteX9" y="connsiteY9"/>
+              </a:cxn>
+              <a:cxn ang="0">
+                <a:pos x="connsiteX10" y="connsiteY10"/>
+              </a:cxn>
+              <a:cxn ang="0">
+                <a:pos x="connsiteX11" y="connsiteY11"/>
+              </a:cxn>
+              <a:cxn ang="0">
+                <a:pos x="connsiteX12" y="connsiteY12"/>
+              </a:cxn>
+              <a:cxn ang="0">
+                <a:pos x="connsiteX13" y="connsiteY13"/>
+              </a:cxn>
+              <a:cxn ang="0">
+                <a:pos x="connsiteX14" y="connsiteY14"/>
+              </a:cxn>
+              <a:cxn ang="0">
+                <a:pos x="connsiteX15" y="connsiteY15"/>
+              </a:cxn>
+              <a:cxn ang="0">
+                <a:pos x="connsiteX16" y="connsiteY16"/>
+              </a:cxn>
+              <a:cxn ang="0">
+                <a:pos x="connsiteX17" y="connsiteY17"/>
+              </a:cxn>
+              <a:cxn ang="0">
+                <a:pos x="connsiteX18" y="connsiteY18"/>
+              </a:cxn>
+              <a:cxn ang="0">
+                <a:pos x="connsiteX19" y="connsiteY19"/>
+              </a:cxn>
+              <a:cxn ang="0">
+                <a:pos x="connsiteX20" y="connsiteY20"/>
+              </a:cxn>
+              <a:cxn ang="0">
+                <a:pos x="connsiteX21" y="connsiteY21"/>
+              </a:cxn>
+              <a:cxn ang="0">
+                <a:pos x="connsiteX22" y="connsiteY22"/>
+              </a:cxn>
+              <a:cxn ang="0">
+                <a:pos x="connsiteX23" y="connsiteY23"/>
+              </a:cxn>
+              <a:cxn ang="0">
+                <a:pos x="connsiteX24" y="connsiteY24"/>
+              </a:cxn>
+              <a:cxn ang="0">
+                <a:pos x="connsiteX25" y="connsiteY25"/>
+              </a:cxn>
+              <a:cxn ang="0">
+                <a:pos x="connsiteX26" y="connsiteY26"/>
+              </a:cxn>
+              <a:cxn ang="0">
+                <a:pos x="connsiteX27" y="connsiteY27"/>
+              </a:cxn>
+              <a:cxn ang="0">
+                <a:pos x="connsiteX28" y="connsiteY28"/>
+              </a:cxn>
+              <a:cxn ang="0">
+                <a:pos x="connsiteX29" y="connsiteY29"/>
+              </a:cxn>
+              <a:cxn ang="0">
+                <a:pos x="connsiteX30" y="connsiteY30"/>
+              </a:cxn>
+              <a:cxn ang="0">
+                <a:pos x="connsiteX31" y="connsiteY31"/>
+              </a:cxn>
+              <a:cxn ang="0">
+                <a:pos x="connsiteX32" y="connsiteY32"/>
+              </a:cxn>
+              <a:cxn ang="0">
+                <a:pos x="connsiteX33" y="connsiteY33"/>
+              </a:cxn>
+              <a:cxn ang="0">
+                <a:pos x="connsiteX34" y="connsiteY34"/>
+              </a:cxn>
+              <a:cxn ang="0">
+                <a:pos x="connsiteX35" y="connsiteY35"/>
+              </a:cxn>
+            </a:cxnLst>
+            <a:rect l="l" t="t" r="r" b="b"/>
+            <a:pathLst>
+              <a:path w="10853928" h="18288" fill="none" extrusionOk="0">
+                <a:moveTo>
+                  <a:pt x="0" y="0"/>
+                </a:moveTo>
+                <a:cubicBezTo>
+                  <a:pt x="146993" y="-19076"/>
+                  <a:pt x="347684" y="-4790"/>
+                  <a:pt x="461292" y="0"/>
+                </a:cubicBezTo>
+                <a:cubicBezTo>
+                  <a:pt x="574900" y="4790"/>
+                  <a:pt x="808367" y="19821"/>
+                  <a:pt x="1139662" y="0"/>
+                </a:cubicBezTo>
+                <a:cubicBezTo>
+                  <a:pt x="1470957" y="-19821"/>
+                  <a:pt x="1627405" y="5721"/>
+                  <a:pt x="1926572" y="0"/>
+                </a:cubicBezTo>
+                <a:cubicBezTo>
+                  <a:pt x="2225739" y="-5721"/>
+                  <a:pt x="2137730" y="-3235"/>
+                  <a:pt x="2279325" y="0"/>
+                </a:cubicBezTo>
+                <a:cubicBezTo>
+                  <a:pt x="2420920" y="3235"/>
+                  <a:pt x="2456518" y="9685"/>
+                  <a:pt x="2632078" y="0"/>
+                </a:cubicBezTo>
+                <a:cubicBezTo>
+                  <a:pt x="2807638" y="-9685"/>
+                  <a:pt x="3211516" y="-43007"/>
+                  <a:pt x="3527527" y="0"/>
+                </a:cubicBezTo>
+                <a:cubicBezTo>
+                  <a:pt x="3843538" y="43007"/>
+                  <a:pt x="4058833" y="22042"/>
+                  <a:pt x="4205897" y="0"/>
+                </a:cubicBezTo>
+                <a:cubicBezTo>
+                  <a:pt x="4352961" y="-22042"/>
+                  <a:pt x="4474805" y="-11846"/>
+                  <a:pt x="4558650" y="0"/>
+                </a:cubicBezTo>
+                <a:cubicBezTo>
+                  <a:pt x="4642495" y="11846"/>
+                  <a:pt x="5041928" y="-6069"/>
+                  <a:pt x="5237020" y="0"/>
+                </a:cubicBezTo>
+                <a:cubicBezTo>
+                  <a:pt x="5432112" y="6069"/>
+                  <a:pt x="5943266" y="-17479"/>
+                  <a:pt x="6132469" y="0"/>
+                </a:cubicBezTo>
+                <a:cubicBezTo>
+                  <a:pt x="6321672" y="17479"/>
+                  <a:pt x="6483872" y="26234"/>
+                  <a:pt x="6702301" y="0"/>
+                </a:cubicBezTo>
+                <a:cubicBezTo>
+                  <a:pt x="6920730" y="-26234"/>
+                  <a:pt x="6991194" y="-15156"/>
+                  <a:pt x="7272132" y="0"/>
+                </a:cubicBezTo>
+                <a:cubicBezTo>
+                  <a:pt x="7553070" y="15156"/>
+                  <a:pt x="7684444" y="-32961"/>
+                  <a:pt x="7950502" y="0"/>
+                </a:cubicBezTo>
+                <a:cubicBezTo>
+                  <a:pt x="8216560" y="32961"/>
+                  <a:pt x="8493290" y="-10491"/>
+                  <a:pt x="8737412" y="0"/>
+                </a:cubicBezTo>
+                <a:cubicBezTo>
+                  <a:pt x="8981534" y="10491"/>
+                  <a:pt x="9191586" y="-13899"/>
+                  <a:pt x="9524322" y="0"/>
+                </a:cubicBezTo>
+                <a:cubicBezTo>
+                  <a:pt x="9857058" y="13899"/>
+                  <a:pt x="10297509" y="7485"/>
+                  <a:pt x="10853928" y="0"/>
+                </a:cubicBezTo>
+                <a:cubicBezTo>
+                  <a:pt x="10854574" y="4451"/>
+                  <a:pt x="10854418" y="9226"/>
+                  <a:pt x="10853928" y="18288"/>
+                </a:cubicBezTo>
+                <a:cubicBezTo>
+                  <a:pt x="10691638" y="28522"/>
+                  <a:pt x="10574319" y="29578"/>
+                  <a:pt x="10392636" y="18288"/>
+                </a:cubicBezTo>
+                <a:cubicBezTo>
+                  <a:pt x="10210953" y="6998"/>
+                  <a:pt x="9836277" y="-16742"/>
+                  <a:pt x="9497187" y="18288"/>
+                </a:cubicBezTo>
+                <a:cubicBezTo>
+                  <a:pt x="9158097" y="53318"/>
+                  <a:pt x="9119479" y="30714"/>
+                  <a:pt x="8818817" y="18288"/>
+                </a:cubicBezTo>
+                <a:cubicBezTo>
+                  <a:pt x="8518155" y="5863"/>
+                  <a:pt x="8640037" y="6483"/>
+                  <a:pt x="8466064" y="18288"/>
+                </a:cubicBezTo>
+                <a:cubicBezTo>
+                  <a:pt x="8292091" y="30093"/>
+                  <a:pt x="7997656" y="18914"/>
+                  <a:pt x="7787693" y="18288"/>
+                </a:cubicBezTo>
+                <a:cubicBezTo>
+                  <a:pt x="7577730" y="17662"/>
+                  <a:pt x="7412468" y="21416"/>
+                  <a:pt x="7217862" y="18288"/>
+                </a:cubicBezTo>
+                <a:cubicBezTo>
+                  <a:pt x="7023256" y="15160"/>
+                  <a:pt x="6898018" y="14824"/>
+                  <a:pt x="6648031" y="18288"/>
+                </a:cubicBezTo>
+                <a:cubicBezTo>
+                  <a:pt x="6398044" y="21752"/>
+                  <a:pt x="6254402" y="38625"/>
+                  <a:pt x="6078200" y="18288"/>
+                </a:cubicBezTo>
+                <a:cubicBezTo>
+                  <a:pt x="5901998" y="-2049"/>
+                  <a:pt x="5622886" y="3213"/>
+                  <a:pt x="5508368" y="18288"/>
+                </a:cubicBezTo>
+                <a:cubicBezTo>
+                  <a:pt x="5393850" y="33363"/>
+                  <a:pt x="5036260" y="26830"/>
+                  <a:pt x="4721459" y="18288"/>
+                </a:cubicBezTo>
+                <a:cubicBezTo>
+                  <a:pt x="4406658" y="9746"/>
+                  <a:pt x="4239221" y="41551"/>
+                  <a:pt x="4043088" y="18288"/>
+                </a:cubicBezTo>
+                <a:cubicBezTo>
+                  <a:pt x="3846955" y="-4975"/>
+                  <a:pt x="3818802" y="34658"/>
+                  <a:pt x="3690336" y="18288"/>
+                </a:cubicBezTo>
+                <a:cubicBezTo>
+                  <a:pt x="3561870" y="1918"/>
+                  <a:pt x="3265491" y="42194"/>
+                  <a:pt x="3120504" y="18288"/>
+                </a:cubicBezTo>
+                <a:cubicBezTo>
+                  <a:pt x="2975517" y="-5618"/>
+                  <a:pt x="2720254" y="36673"/>
+                  <a:pt x="2333595" y="18288"/>
+                </a:cubicBezTo>
+                <a:cubicBezTo>
+                  <a:pt x="1946936" y="-97"/>
+                  <a:pt x="2097241" y="5776"/>
+                  <a:pt x="1872303" y="18288"/>
+                </a:cubicBezTo>
+                <a:cubicBezTo>
+                  <a:pt x="1647365" y="30800"/>
+                  <a:pt x="1282708" y="45380"/>
+                  <a:pt x="976854" y="18288"/>
+                </a:cubicBezTo>
+                <a:cubicBezTo>
+                  <a:pt x="671000" y="-8804"/>
+                  <a:pt x="408401" y="-12775"/>
+                  <a:pt x="0" y="18288"/>
+                </a:cubicBezTo>
+                <a:cubicBezTo>
+                  <a:pt x="-213" y="9468"/>
+                  <a:pt x="187" y="4459"/>
+                  <a:pt x="0" y="0"/>
+                </a:cubicBezTo>
+                <a:close/>
+              </a:path>
+              <a:path w="10853928" h="18288" stroke="0" extrusionOk="0">
+                <a:moveTo>
+                  <a:pt x="0" y="0"/>
+                </a:moveTo>
+                <a:cubicBezTo>
+                  <a:pt x="267322" y="15284"/>
+                  <a:pt x="415388" y="-21048"/>
+                  <a:pt x="569831" y="0"/>
+                </a:cubicBezTo>
+                <a:cubicBezTo>
+                  <a:pt x="724274" y="21048"/>
+                  <a:pt x="769333" y="-2353"/>
+                  <a:pt x="922584" y="0"/>
+                </a:cubicBezTo>
+                <a:cubicBezTo>
+                  <a:pt x="1075835" y="2353"/>
+                  <a:pt x="1399490" y="-145"/>
+                  <a:pt x="1818033" y="0"/>
+                </a:cubicBezTo>
+                <a:cubicBezTo>
+                  <a:pt x="2236576" y="145"/>
+                  <a:pt x="2145330" y="5482"/>
+                  <a:pt x="2387864" y="0"/>
+                </a:cubicBezTo>
+                <a:cubicBezTo>
+                  <a:pt x="2630398" y="-5482"/>
+                  <a:pt x="2793207" y="18487"/>
+                  <a:pt x="2957695" y="0"/>
+                </a:cubicBezTo>
+                <a:cubicBezTo>
+                  <a:pt x="3122183" y="-18487"/>
+                  <a:pt x="3579141" y="19003"/>
+                  <a:pt x="3853144" y="0"/>
+                </a:cubicBezTo>
+                <a:cubicBezTo>
+                  <a:pt x="4127147" y="-19003"/>
+                  <a:pt x="4209857" y="12211"/>
+                  <a:pt x="4314436" y="0"/>
+                </a:cubicBezTo>
+                <a:cubicBezTo>
+                  <a:pt x="4419015" y="-12211"/>
+                  <a:pt x="4762459" y="-17220"/>
+                  <a:pt x="5209885" y="0"/>
+                </a:cubicBezTo>
+                <a:cubicBezTo>
+                  <a:pt x="5657311" y="17220"/>
+                  <a:pt x="5692663" y="-3290"/>
+                  <a:pt x="6105335" y="0"/>
+                </a:cubicBezTo>
+                <a:cubicBezTo>
+                  <a:pt x="6518007" y="3290"/>
+                  <a:pt x="6455516" y="-5124"/>
+                  <a:pt x="6783705" y="0"/>
+                </a:cubicBezTo>
+                <a:cubicBezTo>
+                  <a:pt x="7111894" y="5124"/>
+                  <a:pt x="7441941" y="-17829"/>
+                  <a:pt x="7679154" y="0"/>
+                </a:cubicBezTo>
+                <a:cubicBezTo>
+                  <a:pt x="7916367" y="17829"/>
+                  <a:pt x="8102967" y="-24363"/>
+                  <a:pt x="8248985" y="0"/>
+                </a:cubicBezTo>
+                <a:cubicBezTo>
+                  <a:pt x="8395003" y="24363"/>
+                  <a:pt x="8552393" y="25505"/>
+                  <a:pt x="8818817" y="0"/>
+                </a:cubicBezTo>
+                <a:cubicBezTo>
+                  <a:pt x="9085241" y="-25505"/>
+                  <a:pt x="9411308" y="38000"/>
+                  <a:pt x="9605726" y="0"/>
+                </a:cubicBezTo>
+                <a:cubicBezTo>
+                  <a:pt x="9800144" y="-38000"/>
+                  <a:pt x="10006468" y="-25741"/>
+                  <a:pt x="10175558" y="0"/>
+                </a:cubicBezTo>
+                <a:cubicBezTo>
+                  <a:pt x="10344648" y="25741"/>
+                  <a:pt x="10696282" y="695"/>
+                  <a:pt x="10853928" y="0"/>
+                </a:cubicBezTo>
+                <a:cubicBezTo>
+                  <a:pt x="10853521" y="8690"/>
+                  <a:pt x="10853774" y="14141"/>
+                  <a:pt x="10853928" y="18288"/>
+                </a:cubicBezTo>
+                <a:cubicBezTo>
+                  <a:pt x="10608124" y="24255"/>
+                  <a:pt x="10343415" y="22307"/>
+                  <a:pt x="10067018" y="18288"/>
+                </a:cubicBezTo>
+                <a:cubicBezTo>
+                  <a:pt x="9790621" y="14270"/>
+                  <a:pt x="9843266" y="3564"/>
+                  <a:pt x="9714266" y="18288"/>
+                </a:cubicBezTo>
+                <a:cubicBezTo>
+                  <a:pt x="9585266" y="33012"/>
+                  <a:pt x="9379484" y="1875"/>
+                  <a:pt x="9252974" y="18288"/>
+                </a:cubicBezTo>
+                <a:cubicBezTo>
+                  <a:pt x="9126464" y="34701"/>
+                  <a:pt x="8580678" y="-4904"/>
+                  <a:pt x="8357525" y="18288"/>
+                </a:cubicBezTo>
+                <a:cubicBezTo>
+                  <a:pt x="8134372" y="41480"/>
+                  <a:pt x="7903199" y="26458"/>
+                  <a:pt x="7679154" y="18288"/>
+                </a:cubicBezTo>
+                <a:cubicBezTo>
+                  <a:pt x="7455109" y="10118"/>
+                  <a:pt x="7435944" y="27109"/>
+                  <a:pt x="7217862" y="18288"/>
+                </a:cubicBezTo>
+                <a:cubicBezTo>
+                  <a:pt x="6999780" y="9467"/>
+                  <a:pt x="6680409" y="18985"/>
+                  <a:pt x="6539492" y="18288"/>
+                </a:cubicBezTo>
+                <a:cubicBezTo>
+                  <a:pt x="6398575" y="17592"/>
+                  <a:pt x="6312077" y="33018"/>
+                  <a:pt x="6186739" y="18288"/>
+                </a:cubicBezTo>
+                <a:cubicBezTo>
+                  <a:pt x="6061401" y="3558"/>
+                  <a:pt x="5947033" y="12075"/>
+                  <a:pt x="5833986" y="18288"/>
+                </a:cubicBezTo>
+                <a:cubicBezTo>
+                  <a:pt x="5720939" y="24501"/>
+                  <a:pt x="5482226" y="8586"/>
+                  <a:pt x="5155616" y="18288"/>
+                </a:cubicBezTo>
+                <a:cubicBezTo>
+                  <a:pt x="4829006" y="27991"/>
+                  <a:pt x="4841274" y="29316"/>
+                  <a:pt x="4694324" y="18288"/>
+                </a:cubicBezTo>
+                <a:cubicBezTo>
+                  <a:pt x="4547374" y="7260"/>
+                  <a:pt x="4077675" y="7013"/>
+                  <a:pt x="3907414" y="18288"/>
+                </a:cubicBezTo>
+                <a:cubicBezTo>
+                  <a:pt x="3737153" y="29564"/>
+                  <a:pt x="3538393" y="21630"/>
+                  <a:pt x="3446122" y="18288"/>
+                </a:cubicBezTo>
+                <a:cubicBezTo>
+                  <a:pt x="3353851" y="14946"/>
+                  <a:pt x="2990320" y="-8091"/>
+                  <a:pt x="2659212" y="18288"/>
+                </a:cubicBezTo>
+                <a:cubicBezTo>
+                  <a:pt x="2328104" y="44667"/>
+                  <a:pt x="2427653" y="9607"/>
+                  <a:pt x="2306460" y="18288"/>
+                </a:cubicBezTo>
+                <a:cubicBezTo>
+                  <a:pt x="2185267" y="26969"/>
+                  <a:pt x="1719763" y="3717"/>
+                  <a:pt x="1519550" y="18288"/>
+                </a:cubicBezTo>
+                <a:cubicBezTo>
+                  <a:pt x="1319337" y="32860"/>
+                  <a:pt x="1167371" y="17040"/>
+                  <a:pt x="1058258" y="18288"/>
+                </a:cubicBezTo>
+                <a:cubicBezTo>
+                  <a:pt x="949145" y="19536"/>
+                  <a:pt x="780234" y="31447"/>
+                  <a:pt x="705505" y="18288"/>
+                </a:cubicBezTo>
+                <a:cubicBezTo>
+                  <a:pt x="630776" y="5129"/>
+                  <a:pt x="215796" y="30056"/>
+                  <a:pt x="0" y="18288"/>
+                </a:cubicBezTo>
+                <a:cubicBezTo>
+                  <a:pt x="-53" y="11301"/>
+                  <a:pt x="-649" y="7756"/>
+                  <a:pt x="0" y="0"/>
+                </a:cubicBezTo>
+                <a:close/>
+              </a:path>
+            </a:pathLst>
+          </a:custGeom>
+          <a:solidFill>
+            <a:schemeClr val="accent2"/>
+          </a:solidFill>
+          <a:ln w="41275" cap="rnd">
+            <a:solidFill>
+              <a:schemeClr val="accent2"/>
+            </a:solidFill>
+            <a:round/>
+            <a:extLst>
+              <a:ext uri="{C807C97D-BFC1-408E-A445-0C87EB9F89A2}">
+                <ask:lineSketchStyleProps xmlns:ask="http://schemas.microsoft.com/office/drawing/2018/sketchyshapes" sd="1219033472">
+                  <a:prstGeom prst="rect">
+                    <a:avLst/>
+                  </a:prstGeom>
+                  <ask:type>
+                    <ask:lineSketchFreehand/>
+                  </ask:type>
+                </ask:lineSketchStyleProps>
+              </a:ext>
+            </a:extLst>
+          </a:ln>
+        </p:spPr>
+        <p:style>
+          <a:lnRef idx="2">
+            <a:schemeClr val="accent1">
+              <a:shade val="50000"/>
+            </a:schemeClr>
+          </a:lnRef>
+          <a:fillRef idx="1">
+            <a:schemeClr val="accent1"/>
+          </a:fillRef>
+          <a:effectRef idx="0">
+            <a:schemeClr val="accent1"/>
+          </a:effectRef>
+          <a:fontRef idx="minor">
+            <a:schemeClr val="lt1"/>
+          </a:fontRef>
+        </p:style>
+        <p:txBody>
+          <a:bodyPr rtlCol="0" anchor="ctr"/>
+          <a:lstStyle/>
+          <a:p>
+            <a:pPr algn="ctr"/>
+            <a:endParaRPr lang="en-US"/>
+          </a:p>
+        </p:txBody>
+      </p:sp>
+      <p:sp>
+        <p:nvSpPr>
+          <p:cNvPr id="8" name="Content Placeholder 2">
+            <a:extLst>
+              <a:ext uri="{FF2B5EF4-FFF2-40B4-BE49-F238E27FC236}">
+                <a16:creationId xmlns:a16="http://schemas.microsoft.com/office/drawing/2014/main" id="{DAACDFF4-BC0E-42D7-BBD0-7647D0FBA059}"/>
               </a:ext>
             </a:extLst>
           </p:cNvPr>
@@ -6881,19 +8709,79 @@
             <p:ph idx="1"/>
           </p:nvPr>
         </p:nvSpPr>
-        <p:spPr/>
+        <p:spPr>
+          <a:xfrm>
+            <a:off x="838200" y="1929384"/>
+            <a:ext cx="10515600" cy="4251960"/>
+          </a:xfrm>
+        </p:spPr>
         <p:txBody>
-          <a:bodyPr/>
+          <a:bodyPr>
+            <a:normAutofit/>
+          </a:bodyPr>
           <a:lstStyle/>
           <a:p>
-            <a:endParaRPr lang="en-US"/>
+            <a:r>
+              <a:rPr lang="en-US" sz="2200" dirty="0"/>
+              <a:t>Given the imbalanced nature of these data, we saw disparate accuracies when comparing the normal quality category to the rare (low, high) quality categories.</a:t>
+            </a:r>
+          </a:p>
+          <a:p>
+            <a:r>
+              <a:rPr lang="en-US" sz="2200" dirty="0"/>
+              <a:t>The SMOTE algorithm provided a methodology for </a:t>
+            </a:r>
+            <a:r>
+              <a:rPr lang="en-US" sz="2200" dirty="0" err="1"/>
+              <a:t>undersampling</a:t>
+            </a:r>
+            <a:r>
+              <a:rPr lang="en-US" sz="2200" dirty="0"/>
+              <a:t> and oversampling, which showed small improvement with </a:t>
+            </a:r>
+            <a:r>
+              <a:rPr lang="en-US" sz="2200" dirty="0" err="1"/>
+              <a:t>undersampling</a:t>
+            </a:r>
+            <a:r>
+              <a:rPr lang="en-US" sz="2200" dirty="0"/>
+              <a:t> and excellent improvement with oversampling</a:t>
+            </a:r>
+          </a:p>
+          <a:p>
+            <a:r>
+              <a:rPr lang="en-US" sz="2200" dirty="0"/>
+              <a:t>There was a small trade-off regarding accuracy of the normal quality wine with the improvement we saw in oversampling of the rare quality categories</a:t>
+            </a:r>
+          </a:p>
+          <a:p>
+            <a:r>
+              <a:rPr lang="en-US" sz="2200" dirty="0"/>
+              <a:t>Grid search of tuning parameters revealed the optimal combination </a:t>
+            </a:r>
+            <a:r>
+              <a:rPr lang="en-US" sz="2200"/>
+              <a:t>of parameters</a:t>
+            </a:r>
+            <a:endParaRPr lang="en-US" sz="2200" dirty="0"/>
+          </a:p>
+          <a:p>
+            <a:r>
+              <a:rPr lang="en-US" sz="2200" dirty="0"/>
+              <a:t>Future work consists of pursuing additional methodologies to improve the relative lack of performance with </a:t>
+            </a:r>
+            <a:r>
+              <a:rPr lang="en-US" sz="2200" dirty="0" err="1"/>
+              <a:t>undersampling</a:t>
+            </a:r>
+            <a:endParaRPr lang="en-US" sz="2200" dirty="0"/>
           </a:p>
         </p:txBody>
       </p:sp>
     </p:spTree>
     <p:extLst>
       <p:ext uri="{BB962C8B-B14F-4D97-AF65-F5344CB8AC3E}">
-        <p14:creationId xmlns:p14="http://schemas.microsoft.com/office/powerpoint/2010/main" val="1214429102"/>
+        <p14:creationId xmlns:p14="http://schemas.microsoft.com/office/powerpoint/2010/main" val="1432276014"/>
       </p:ext>
     </p:extLst>
   </p:cSld>
@@ -6903,7 +8791,7 @@
 </p:sld>
 </file>
 
-<file path=ppt/slides/slide11.xml><?xml version="1.0" encoding="utf-8"?>
+<file path=ppt/slides/slide12.xml><?xml version="1.0" encoding="utf-8"?>
 <p:sld xmlns:a="http://schemas.openxmlformats.org/drawingml/2006/main" xmlns:r="http://schemas.openxmlformats.org/officeDocument/2006/relationships" xmlns:p="http://schemas.openxmlformats.org/presentationml/2006/main">
   <p:cSld>
     <p:spTree>
@@ -7166,7 +9054,7 @@
 </p:sld>
 </file>
 
-<file path=ppt/slides/slide12.xml><?xml version="1.0" encoding="utf-8"?>
+<file path=ppt/slides/slide13.xml><?xml version="1.0" encoding="utf-8"?>
 <p:sld xmlns:a="http://schemas.openxmlformats.org/drawingml/2006/main" xmlns:r="http://schemas.openxmlformats.org/officeDocument/2006/relationships" xmlns:p="http://schemas.openxmlformats.org/presentationml/2006/main">
   <p:cSld>
     <p:bg>
@@ -9918,7 +11806,7 @@
           <a:p>
             <a:r>
               <a:rPr lang="en-US" sz="2200" dirty="0"/>
-              <a:t>Marketing campaigns are linked to the communication of quality, so the measurement of this quality is essential</a:t>
+              <a:t>Marketing campaigns and sales of wine are linked to quality attributes, and the measurement of such is essential</a:t>
             </a:r>
           </a:p>
           <a:p>
@@ -14973,6 +16861,14 @@
 <file path=ppt/slides/slide9.xml><?xml version="1.0" encoding="utf-8"?>
 <p:sld xmlns:a="http://schemas.openxmlformats.org/drawingml/2006/main" xmlns:r="http://schemas.openxmlformats.org/officeDocument/2006/relationships" xmlns:p="http://schemas.openxmlformats.org/presentationml/2006/main">
   <p:cSld>
+    <p:bg>
+      <p:bgPr>
+        <a:solidFill>
+          <a:schemeClr val="bg1"/>
+        </a:solidFill>
+        <a:effectLst/>
+      </p:bgPr>
+    </p:bg>
     <p:spTree>
       <p:nvGrpSpPr>
         <p:cNvPr id="1" name=""/>
@@ -14987,12 +16883,72 @@
           <a:chExt cx="0" cy="0"/>
         </a:xfrm>
       </p:grpSpPr>
+      <p:sp useBgFill="1">
+        <p:nvSpPr>
+          <p:cNvPr id="11" name="Rectangle 10">
+            <a:extLst>
+              <a:ext uri="{FF2B5EF4-FFF2-40B4-BE49-F238E27FC236}">
+                <a16:creationId xmlns:a16="http://schemas.microsoft.com/office/drawing/2014/main" id="{100EDD19-6802-4EC3-95CE-CFFAB042CFD6}"/>
+              </a:ext>
+              <a:ext uri="{C183D7F6-B498-43B3-948B-1728B52AA6E4}">
+                <adec:decorative xmlns:adec="http://schemas.microsoft.com/office/drawing/2017/decorative" val="1"/>
+              </a:ext>
+            </a:extLst>
+          </p:cNvPr>
+          <p:cNvSpPr>
+            <a:spLocks noGrp="1" noRot="1" noChangeAspect="1" noMove="1" noResize="1" noEditPoints="1" noAdjustHandles="1" noChangeArrowheads="1" noChangeShapeType="1" noTextEdit="1"/>
+          </p:cNvSpPr>
+          <p:nvPr>
+            <p:extLst>
+              <p:ext uri="{386F3935-93C4-4BCD-93E2-E3B085C9AB24}">
+                <p16:designElem xmlns:p16="http://schemas.microsoft.com/office/powerpoint/2015/main" val="1"/>
+              </p:ext>
+            </p:extLst>
+          </p:nvPr>
+        </p:nvSpPr>
+        <p:spPr>
+          <a:xfrm>
+            <a:off x="0" y="0"/>
+            <a:ext cx="12188952" cy="6858000"/>
+          </a:xfrm>
+          <a:prstGeom prst="rect">
+            <a:avLst/>
+          </a:prstGeom>
+          <a:ln>
+            <a:noFill/>
+          </a:ln>
+        </p:spPr>
+        <p:style>
+          <a:lnRef idx="2">
+            <a:schemeClr val="accent1">
+              <a:shade val="50000"/>
+            </a:schemeClr>
+          </a:lnRef>
+          <a:fillRef idx="1">
+            <a:schemeClr val="accent1"/>
+          </a:fillRef>
+          <a:effectRef idx="0">
+            <a:schemeClr val="accent1"/>
+          </a:effectRef>
+          <a:fontRef idx="minor">
+            <a:schemeClr val="lt1"/>
+          </a:fontRef>
+        </p:style>
+        <p:txBody>
+          <a:bodyPr rtlCol="0" anchor="ctr"/>
+          <a:lstStyle/>
+          <a:p>
+            <a:pPr algn="ctr"/>
+            <a:endParaRPr lang="en-US"/>
+          </a:p>
+        </p:txBody>
+      </p:sp>
       <p:sp>
         <p:nvSpPr>
           <p:cNvPr id="2" name="Title 1">
             <a:extLst>
               <a:ext uri="{FF2B5EF4-FFF2-40B4-BE49-F238E27FC236}">
-                <a16:creationId xmlns:a16="http://schemas.microsoft.com/office/drawing/2014/main" id="{779B7007-97E4-40FB-87E6-22E3166854F1}"/>
+                <a16:creationId xmlns:a16="http://schemas.microsoft.com/office/drawing/2014/main" id="{EABAB166-3C39-43D1-8F8B-9DB2DEE2352F}"/>
               </a:ext>
             </a:extLst>
           </p:cNvPr>
@@ -15003,24 +16959,699 @@
             <p:ph type="title"/>
           </p:nvPr>
         </p:nvSpPr>
-        <p:spPr/>
+        <p:spPr>
+          <a:xfrm>
+            <a:off x="838200" y="365125"/>
+            <a:ext cx="10515600" cy="1325563"/>
+          </a:xfrm>
+        </p:spPr>
         <p:txBody>
-          <a:bodyPr/>
+          <a:bodyPr>
+            <a:normAutofit/>
+          </a:bodyPr>
           <a:lstStyle/>
           <a:p>
             <a:r>
-              <a:rPr lang="en-US" dirty="0"/>
-              <a:t>Results (Sarah)</a:t>
+              <a:rPr lang="en-US" sz="5400" dirty="0"/>
+              <a:t>Results: Accuracy</a:t>
             </a:r>
           </a:p>
         </p:txBody>
       </p:sp>
       <p:sp>
         <p:nvSpPr>
-          <p:cNvPr id="3" name="Content Placeholder 2">
+          <p:cNvPr id="13" name="sketch line">
             <a:extLst>
               <a:ext uri="{FF2B5EF4-FFF2-40B4-BE49-F238E27FC236}">
-                <a16:creationId xmlns:a16="http://schemas.microsoft.com/office/drawing/2014/main" id="{1F15F299-8ABB-4484-B018-9D2F77E28183}"/>
+                <a16:creationId xmlns:a16="http://schemas.microsoft.com/office/drawing/2014/main" id="{DB17E863-922E-4C26-BD64-E8FD41D28661}"/>
+              </a:ext>
+              <a:ext uri="{C183D7F6-B498-43B3-948B-1728B52AA6E4}">
+                <adec:decorative xmlns:adec="http://schemas.microsoft.com/office/drawing/2017/decorative" val="1"/>
+              </a:ext>
+            </a:extLst>
+          </p:cNvPr>
+          <p:cNvSpPr>
+            <a:spLocks noGrp="1" noRot="1" noChangeAspect="1" noMove="1" noResize="1" noEditPoints="1" noAdjustHandles="1" noChangeArrowheads="1" noChangeShapeType="1" noTextEdit="1"/>
+          </p:cNvSpPr>
+          <p:nvPr>
+            <p:extLst>
+              <p:ext uri="{386F3935-93C4-4BCD-93E2-E3B085C9AB24}">
+                <p16:designElem xmlns:p16="http://schemas.microsoft.com/office/powerpoint/2015/main" val="1"/>
+              </p:ext>
+            </p:extLst>
+          </p:nvPr>
+        </p:nvSpPr>
+        <p:spPr>
+          <a:xfrm>
+            <a:off x="669036" y="1677373"/>
+            <a:ext cx="10853928" cy="18288"/>
+          </a:xfrm>
+          <a:custGeom>
+            <a:avLst/>
+            <a:gdLst>
+              <a:gd name="connsiteX0" fmla="*/ 0 w 10853928"/>
+              <a:gd name="connsiteY0" fmla="*/ 0 h 18288"/>
+              <a:gd name="connsiteX1" fmla="*/ 461292 w 10853928"/>
+              <a:gd name="connsiteY1" fmla="*/ 0 h 18288"/>
+              <a:gd name="connsiteX2" fmla="*/ 1139662 w 10853928"/>
+              <a:gd name="connsiteY2" fmla="*/ 0 h 18288"/>
+              <a:gd name="connsiteX3" fmla="*/ 1926572 w 10853928"/>
+              <a:gd name="connsiteY3" fmla="*/ 0 h 18288"/>
+              <a:gd name="connsiteX4" fmla="*/ 2279325 w 10853928"/>
+              <a:gd name="connsiteY4" fmla="*/ 0 h 18288"/>
+              <a:gd name="connsiteX5" fmla="*/ 2632078 w 10853928"/>
+              <a:gd name="connsiteY5" fmla="*/ 0 h 18288"/>
+              <a:gd name="connsiteX6" fmla="*/ 3527527 w 10853928"/>
+              <a:gd name="connsiteY6" fmla="*/ 0 h 18288"/>
+              <a:gd name="connsiteX7" fmla="*/ 4205897 w 10853928"/>
+              <a:gd name="connsiteY7" fmla="*/ 0 h 18288"/>
+              <a:gd name="connsiteX8" fmla="*/ 4558650 w 10853928"/>
+              <a:gd name="connsiteY8" fmla="*/ 0 h 18288"/>
+              <a:gd name="connsiteX9" fmla="*/ 5237020 w 10853928"/>
+              <a:gd name="connsiteY9" fmla="*/ 0 h 18288"/>
+              <a:gd name="connsiteX10" fmla="*/ 6132469 w 10853928"/>
+              <a:gd name="connsiteY10" fmla="*/ 0 h 18288"/>
+              <a:gd name="connsiteX11" fmla="*/ 6702301 w 10853928"/>
+              <a:gd name="connsiteY11" fmla="*/ 0 h 18288"/>
+              <a:gd name="connsiteX12" fmla="*/ 7272132 w 10853928"/>
+              <a:gd name="connsiteY12" fmla="*/ 0 h 18288"/>
+              <a:gd name="connsiteX13" fmla="*/ 7950502 w 10853928"/>
+              <a:gd name="connsiteY13" fmla="*/ 0 h 18288"/>
+              <a:gd name="connsiteX14" fmla="*/ 8737412 w 10853928"/>
+              <a:gd name="connsiteY14" fmla="*/ 0 h 18288"/>
+              <a:gd name="connsiteX15" fmla="*/ 9524322 w 10853928"/>
+              <a:gd name="connsiteY15" fmla="*/ 0 h 18288"/>
+              <a:gd name="connsiteX16" fmla="*/ 10853928 w 10853928"/>
+              <a:gd name="connsiteY16" fmla="*/ 0 h 18288"/>
+              <a:gd name="connsiteX17" fmla="*/ 10853928 w 10853928"/>
+              <a:gd name="connsiteY17" fmla="*/ 18288 h 18288"/>
+              <a:gd name="connsiteX18" fmla="*/ 10392636 w 10853928"/>
+              <a:gd name="connsiteY18" fmla="*/ 18288 h 18288"/>
+              <a:gd name="connsiteX19" fmla="*/ 9497187 w 10853928"/>
+              <a:gd name="connsiteY19" fmla="*/ 18288 h 18288"/>
+              <a:gd name="connsiteX20" fmla="*/ 8818817 w 10853928"/>
+              <a:gd name="connsiteY20" fmla="*/ 18288 h 18288"/>
+              <a:gd name="connsiteX21" fmla="*/ 8466064 w 10853928"/>
+              <a:gd name="connsiteY21" fmla="*/ 18288 h 18288"/>
+              <a:gd name="connsiteX22" fmla="*/ 7787693 w 10853928"/>
+              <a:gd name="connsiteY22" fmla="*/ 18288 h 18288"/>
+              <a:gd name="connsiteX23" fmla="*/ 7217862 w 10853928"/>
+              <a:gd name="connsiteY23" fmla="*/ 18288 h 18288"/>
+              <a:gd name="connsiteX24" fmla="*/ 6648031 w 10853928"/>
+              <a:gd name="connsiteY24" fmla="*/ 18288 h 18288"/>
+              <a:gd name="connsiteX25" fmla="*/ 6078200 w 10853928"/>
+              <a:gd name="connsiteY25" fmla="*/ 18288 h 18288"/>
+              <a:gd name="connsiteX26" fmla="*/ 5508368 w 10853928"/>
+              <a:gd name="connsiteY26" fmla="*/ 18288 h 18288"/>
+              <a:gd name="connsiteX27" fmla="*/ 4721459 w 10853928"/>
+              <a:gd name="connsiteY27" fmla="*/ 18288 h 18288"/>
+              <a:gd name="connsiteX28" fmla="*/ 4043088 w 10853928"/>
+              <a:gd name="connsiteY28" fmla="*/ 18288 h 18288"/>
+              <a:gd name="connsiteX29" fmla="*/ 3690336 w 10853928"/>
+              <a:gd name="connsiteY29" fmla="*/ 18288 h 18288"/>
+              <a:gd name="connsiteX30" fmla="*/ 3120504 w 10853928"/>
+              <a:gd name="connsiteY30" fmla="*/ 18288 h 18288"/>
+              <a:gd name="connsiteX31" fmla="*/ 2333595 w 10853928"/>
+              <a:gd name="connsiteY31" fmla="*/ 18288 h 18288"/>
+              <a:gd name="connsiteX32" fmla="*/ 1872303 w 10853928"/>
+              <a:gd name="connsiteY32" fmla="*/ 18288 h 18288"/>
+              <a:gd name="connsiteX33" fmla="*/ 976854 w 10853928"/>
+              <a:gd name="connsiteY33" fmla="*/ 18288 h 18288"/>
+              <a:gd name="connsiteX34" fmla="*/ 0 w 10853928"/>
+              <a:gd name="connsiteY34" fmla="*/ 18288 h 18288"/>
+              <a:gd name="connsiteX35" fmla="*/ 0 w 10853928"/>
+              <a:gd name="connsiteY35" fmla="*/ 0 h 18288"/>
+            </a:gdLst>
+            <a:ahLst/>
+            <a:cxnLst>
+              <a:cxn ang="0">
+                <a:pos x="connsiteX0" y="connsiteY0"/>
+              </a:cxn>
+              <a:cxn ang="0">
+                <a:pos x="connsiteX1" y="connsiteY1"/>
+              </a:cxn>
+              <a:cxn ang="0">
+                <a:pos x="connsiteX2" y="connsiteY2"/>
+              </a:cxn>
+              <a:cxn ang="0">
+                <a:pos x="connsiteX3" y="connsiteY3"/>
+              </a:cxn>
+              <a:cxn ang="0">
+                <a:pos x="connsiteX4" y="connsiteY4"/>
+              </a:cxn>
+              <a:cxn ang="0">
+                <a:pos x="connsiteX5" y="connsiteY5"/>
+              </a:cxn>
+              <a:cxn ang="0">
+                <a:pos x="connsiteX6" y="connsiteY6"/>
+              </a:cxn>
+              <a:cxn ang="0">
+                <a:pos x="connsiteX7" y="connsiteY7"/>
+              </a:cxn>
+              <a:cxn ang="0">
+                <a:pos x="connsiteX8" y="connsiteY8"/>
+              </a:cxn>
+              <a:cxn ang="0">
+                <a:pos x="connsiteX9" y="connsiteY9"/>
+              </a:cxn>
+              <a:cxn ang="0">
+                <a:pos x="connsiteX10" y="connsiteY10"/>
+              </a:cxn>
+              <a:cxn ang="0">
+                <a:pos x="connsiteX11" y="connsiteY11"/>
+              </a:cxn>
+              <a:cxn ang="0">
+                <a:pos x="connsiteX12" y="connsiteY12"/>
+              </a:cxn>
+              <a:cxn ang="0">
+                <a:pos x="connsiteX13" y="connsiteY13"/>
+              </a:cxn>
+              <a:cxn ang="0">
+                <a:pos x="connsiteX14" y="connsiteY14"/>
+              </a:cxn>
+              <a:cxn ang="0">
+                <a:pos x="connsiteX15" y="connsiteY15"/>
+              </a:cxn>
+              <a:cxn ang="0">
+                <a:pos x="connsiteX16" y="connsiteY16"/>
+              </a:cxn>
+              <a:cxn ang="0">
+                <a:pos x="connsiteX17" y="connsiteY17"/>
+              </a:cxn>
+              <a:cxn ang="0">
+                <a:pos x="connsiteX18" y="connsiteY18"/>
+              </a:cxn>
+              <a:cxn ang="0">
+                <a:pos x="connsiteX19" y="connsiteY19"/>
+              </a:cxn>
+              <a:cxn ang="0">
+                <a:pos x="connsiteX20" y="connsiteY20"/>
+              </a:cxn>
+              <a:cxn ang="0">
+                <a:pos x="connsiteX21" y="connsiteY21"/>
+              </a:cxn>
+              <a:cxn ang="0">
+                <a:pos x="connsiteX22" y="connsiteY22"/>
+              </a:cxn>
+              <a:cxn ang="0">
+                <a:pos x="connsiteX23" y="connsiteY23"/>
+              </a:cxn>
+              <a:cxn ang="0">
+                <a:pos x="connsiteX24" y="connsiteY24"/>
+              </a:cxn>
+              <a:cxn ang="0">
+                <a:pos x="connsiteX25" y="connsiteY25"/>
+              </a:cxn>
+              <a:cxn ang="0">
+                <a:pos x="connsiteX26" y="connsiteY26"/>
+              </a:cxn>
+              <a:cxn ang="0">
+                <a:pos x="connsiteX27" y="connsiteY27"/>
+              </a:cxn>
+              <a:cxn ang="0">
+                <a:pos x="connsiteX28" y="connsiteY28"/>
+              </a:cxn>
+              <a:cxn ang="0">
+                <a:pos x="connsiteX29" y="connsiteY29"/>
+              </a:cxn>
+              <a:cxn ang="0">
+                <a:pos x="connsiteX30" y="connsiteY30"/>
+              </a:cxn>
+              <a:cxn ang="0">
+                <a:pos x="connsiteX31" y="connsiteY31"/>
+              </a:cxn>
+              <a:cxn ang="0">
+                <a:pos x="connsiteX32" y="connsiteY32"/>
+              </a:cxn>
+              <a:cxn ang="0">
+                <a:pos x="connsiteX33" y="connsiteY33"/>
+              </a:cxn>
+              <a:cxn ang="0">
+                <a:pos x="connsiteX34" y="connsiteY34"/>
+              </a:cxn>
+              <a:cxn ang="0">
+                <a:pos x="connsiteX35" y="connsiteY35"/>
+              </a:cxn>
+            </a:cxnLst>
+            <a:rect l="l" t="t" r="r" b="b"/>
+            <a:pathLst>
+              <a:path w="10853928" h="18288" fill="none" extrusionOk="0">
+                <a:moveTo>
+                  <a:pt x="0" y="0"/>
+                </a:moveTo>
+                <a:cubicBezTo>
+                  <a:pt x="146993" y="-19076"/>
+                  <a:pt x="347684" y="-4790"/>
+                  <a:pt x="461292" y="0"/>
+                </a:cubicBezTo>
+                <a:cubicBezTo>
+                  <a:pt x="574900" y="4790"/>
+                  <a:pt x="808367" y="19821"/>
+                  <a:pt x="1139662" y="0"/>
+                </a:cubicBezTo>
+                <a:cubicBezTo>
+                  <a:pt x="1470957" y="-19821"/>
+                  <a:pt x="1627405" y="5721"/>
+                  <a:pt x="1926572" y="0"/>
+                </a:cubicBezTo>
+                <a:cubicBezTo>
+                  <a:pt x="2225739" y="-5721"/>
+                  <a:pt x="2137730" y="-3235"/>
+                  <a:pt x="2279325" y="0"/>
+                </a:cubicBezTo>
+                <a:cubicBezTo>
+                  <a:pt x="2420920" y="3235"/>
+                  <a:pt x="2456518" y="9685"/>
+                  <a:pt x="2632078" y="0"/>
+                </a:cubicBezTo>
+                <a:cubicBezTo>
+                  <a:pt x="2807638" y="-9685"/>
+                  <a:pt x="3211516" y="-43007"/>
+                  <a:pt x="3527527" y="0"/>
+                </a:cubicBezTo>
+                <a:cubicBezTo>
+                  <a:pt x="3843538" y="43007"/>
+                  <a:pt x="4058833" y="22042"/>
+                  <a:pt x="4205897" y="0"/>
+                </a:cubicBezTo>
+                <a:cubicBezTo>
+                  <a:pt x="4352961" y="-22042"/>
+                  <a:pt x="4474805" y="-11846"/>
+                  <a:pt x="4558650" y="0"/>
+                </a:cubicBezTo>
+                <a:cubicBezTo>
+                  <a:pt x="4642495" y="11846"/>
+                  <a:pt x="5041928" y="-6069"/>
+                  <a:pt x="5237020" y="0"/>
+                </a:cubicBezTo>
+                <a:cubicBezTo>
+                  <a:pt x="5432112" y="6069"/>
+                  <a:pt x="5943266" y="-17479"/>
+                  <a:pt x="6132469" y="0"/>
+                </a:cubicBezTo>
+                <a:cubicBezTo>
+                  <a:pt x="6321672" y="17479"/>
+                  <a:pt x="6483872" y="26234"/>
+                  <a:pt x="6702301" y="0"/>
+                </a:cubicBezTo>
+                <a:cubicBezTo>
+                  <a:pt x="6920730" y="-26234"/>
+                  <a:pt x="6991194" y="-15156"/>
+                  <a:pt x="7272132" y="0"/>
+                </a:cubicBezTo>
+                <a:cubicBezTo>
+                  <a:pt x="7553070" y="15156"/>
+                  <a:pt x="7684444" y="-32961"/>
+                  <a:pt x="7950502" y="0"/>
+                </a:cubicBezTo>
+                <a:cubicBezTo>
+                  <a:pt x="8216560" y="32961"/>
+                  <a:pt x="8493290" y="-10491"/>
+                  <a:pt x="8737412" y="0"/>
+                </a:cubicBezTo>
+                <a:cubicBezTo>
+                  <a:pt x="8981534" y="10491"/>
+                  <a:pt x="9191586" y="-13899"/>
+                  <a:pt x="9524322" y="0"/>
+                </a:cubicBezTo>
+                <a:cubicBezTo>
+                  <a:pt x="9857058" y="13899"/>
+                  <a:pt x="10297509" y="7485"/>
+                  <a:pt x="10853928" y="0"/>
+                </a:cubicBezTo>
+                <a:cubicBezTo>
+                  <a:pt x="10854574" y="4451"/>
+                  <a:pt x="10854418" y="9226"/>
+                  <a:pt x="10853928" y="18288"/>
+                </a:cubicBezTo>
+                <a:cubicBezTo>
+                  <a:pt x="10691638" y="28522"/>
+                  <a:pt x="10574319" y="29578"/>
+                  <a:pt x="10392636" y="18288"/>
+                </a:cubicBezTo>
+                <a:cubicBezTo>
+                  <a:pt x="10210953" y="6998"/>
+                  <a:pt x="9836277" y="-16742"/>
+                  <a:pt x="9497187" y="18288"/>
+                </a:cubicBezTo>
+                <a:cubicBezTo>
+                  <a:pt x="9158097" y="53318"/>
+                  <a:pt x="9119479" y="30714"/>
+                  <a:pt x="8818817" y="18288"/>
+                </a:cubicBezTo>
+                <a:cubicBezTo>
+                  <a:pt x="8518155" y="5863"/>
+                  <a:pt x="8640037" y="6483"/>
+                  <a:pt x="8466064" y="18288"/>
+                </a:cubicBezTo>
+                <a:cubicBezTo>
+                  <a:pt x="8292091" y="30093"/>
+                  <a:pt x="7997656" y="18914"/>
+                  <a:pt x="7787693" y="18288"/>
+                </a:cubicBezTo>
+                <a:cubicBezTo>
+                  <a:pt x="7577730" y="17662"/>
+                  <a:pt x="7412468" y="21416"/>
+                  <a:pt x="7217862" y="18288"/>
+                </a:cubicBezTo>
+                <a:cubicBezTo>
+                  <a:pt x="7023256" y="15160"/>
+                  <a:pt x="6898018" y="14824"/>
+                  <a:pt x="6648031" y="18288"/>
+                </a:cubicBezTo>
+                <a:cubicBezTo>
+                  <a:pt x="6398044" y="21752"/>
+                  <a:pt x="6254402" y="38625"/>
+                  <a:pt x="6078200" y="18288"/>
+                </a:cubicBezTo>
+                <a:cubicBezTo>
+                  <a:pt x="5901998" y="-2049"/>
+                  <a:pt x="5622886" y="3213"/>
+                  <a:pt x="5508368" y="18288"/>
+                </a:cubicBezTo>
+                <a:cubicBezTo>
+                  <a:pt x="5393850" y="33363"/>
+                  <a:pt x="5036260" y="26830"/>
+                  <a:pt x="4721459" y="18288"/>
+                </a:cubicBezTo>
+                <a:cubicBezTo>
+                  <a:pt x="4406658" y="9746"/>
+                  <a:pt x="4239221" y="41551"/>
+                  <a:pt x="4043088" y="18288"/>
+                </a:cubicBezTo>
+                <a:cubicBezTo>
+                  <a:pt x="3846955" y="-4975"/>
+                  <a:pt x="3818802" y="34658"/>
+                  <a:pt x="3690336" y="18288"/>
+                </a:cubicBezTo>
+                <a:cubicBezTo>
+                  <a:pt x="3561870" y="1918"/>
+                  <a:pt x="3265491" y="42194"/>
+                  <a:pt x="3120504" y="18288"/>
+                </a:cubicBezTo>
+                <a:cubicBezTo>
+                  <a:pt x="2975517" y="-5618"/>
+                  <a:pt x="2720254" y="36673"/>
+                  <a:pt x="2333595" y="18288"/>
+                </a:cubicBezTo>
+                <a:cubicBezTo>
+                  <a:pt x="1946936" y="-97"/>
+                  <a:pt x="2097241" y="5776"/>
+                  <a:pt x="1872303" y="18288"/>
+                </a:cubicBezTo>
+                <a:cubicBezTo>
+                  <a:pt x="1647365" y="30800"/>
+                  <a:pt x="1282708" y="45380"/>
+                  <a:pt x="976854" y="18288"/>
+                </a:cubicBezTo>
+                <a:cubicBezTo>
+                  <a:pt x="671000" y="-8804"/>
+                  <a:pt x="408401" y="-12775"/>
+                  <a:pt x="0" y="18288"/>
+                </a:cubicBezTo>
+                <a:cubicBezTo>
+                  <a:pt x="-213" y="9468"/>
+                  <a:pt x="187" y="4459"/>
+                  <a:pt x="0" y="0"/>
+                </a:cubicBezTo>
+                <a:close/>
+              </a:path>
+              <a:path w="10853928" h="18288" stroke="0" extrusionOk="0">
+                <a:moveTo>
+                  <a:pt x="0" y="0"/>
+                </a:moveTo>
+                <a:cubicBezTo>
+                  <a:pt x="267322" y="15284"/>
+                  <a:pt x="415388" y="-21048"/>
+                  <a:pt x="569831" y="0"/>
+                </a:cubicBezTo>
+                <a:cubicBezTo>
+                  <a:pt x="724274" y="21048"/>
+                  <a:pt x="769333" y="-2353"/>
+                  <a:pt x="922584" y="0"/>
+                </a:cubicBezTo>
+                <a:cubicBezTo>
+                  <a:pt x="1075835" y="2353"/>
+                  <a:pt x="1399490" y="-145"/>
+                  <a:pt x="1818033" y="0"/>
+                </a:cubicBezTo>
+                <a:cubicBezTo>
+                  <a:pt x="2236576" y="145"/>
+                  <a:pt x="2145330" y="5482"/>
+                  <a:pt x="2387864" y="0"/>
+                </a:cubicBezTo>
+                <a:cubicBezTo>
+                  <a:pt x="2630398" y="-5482"/>
+                  <a:pt x="2793207" y="18487"/>
+                  <a:pt x="2957695" y="0"/>
+                </a:cubicBezTo>
+                <a:cubicBezTo>
+                  <a:pt x="3122183" y="-18487"/>
+                  <a:pt x="3579141" y="19003"/>
+                  <a:pt x="3853144" y="0"/>
+                </a:cubicBezTo>
+                <a:cubicBezTo>
+                  <a:pt x="4127147" y="-19003"/>
+                  <a:pt x="4209857" y="12211"/>
+                  <a:pt x="4314436" y="0"/>
+                </a:cubicBezTo>
+                <a:cubicBezTo>
+                  <a:pt x="4419015" y="-12211"/>
+                  <a:pt x="4762459" y="-17220"/>
+                  <a:pt x="5209885" y="0"/>
+                </a:cubicBezTo>
+                <a:cubicBezTo>
+                  <a:pt x="5657311" y="17220"/>
+                  <a:pt x="5692663" y="-3290"/>
+                  <a:pt x="6105335" y="0"/>
+                </a:cubicBezTo>
+                <a:cubicBezTo>
+                  <a:pt x="6518007" y="3290"/>
+                  <a:pt x="6455516" y="-5124"/>
+                  <a:pt x="6783705" y="0"/>
+                </a:cubicBezTo>
+                <a:cubicBezTo>
+                  <a:pt x="7111894" y="5124"/>
+                  <a:pt x="7441941" y="-17829"/>
+                  <a:pt x="7679154" y="0"/>
+                </a:cubicBezTo>
+                <a:cubicBezTo>
+                  <a:pt x="7916367" y="17829"/>
+                  <a:pt x="8102967" y="-24363"/>
+                  <a:pt x="8248985" y="0"/>
+                </a:cubicBezTo>
+                <a:cubicBezTo>
+                  <a:pt x="8395003" y="24363"/>
+                  <a:pt x="8552393" y="25505"/>
+                  <a:pt x="8818817" y="0"/>
+                </a:cubicBezTo>
+                <a:cubicBezTo>
+                  <a:pt x="9085241" y="-25505"/>
+                  <a:pt x="9411308" y="38000"/>
+                  <a:pt x="9605726" y="0"/>
+                </a:cubicBezTo>
+                <a:cubicBezTo>
+                  <a:pt x="9800144" y="-38000"/>
+                  <a:pt x="10006468" y="-25741"/>
+                  <a:pt x="10175558" y="0"/>
+                </a:cubicBezTo>
+                <a:cubicBezTo>
+                  <a:pt x="10344648" y="25741"/>
+                  <a:pt x="10696282" y="695"/>
+                  <a:pt x="10853928" y="0"/>
+                </a:cubicBezTo>
+                <a:cubicBezTo>
+                  <a:pt x="10853521" y="8690"/>
+                  <a:pt x="10853774" y="14141"/>
+                  <a:pt x="10853928" y="18288"/>
+                </a:cubicBezTo>
+                <a:cubicBezTo>
+                  <a:pt x="10608124" y="24255"/>
+                  <a:pt x="10343415" y="22307"/>
+                  <a:pt x="10067018" y="18288"/>
+                </a:cubicBezTo>
+                <a:cubicBezTo>
+                  <a:pt x="9790621" y="14270"/>
+                  <a:pt x="9843266" y="3564"/>
+                  <a:pt x="9714266" y="18288"/>
+                </a:cubicBezTo>
+                <a:cubicBezTo>
+                  <a:pt x="9585266" y="33012"/>
+                  <a:pt x="9379484" y="1875"/>
+                  <a:pt x="9252974" y="18288"/>
+                </a:cubicBezTo>
+                <a:cubicBezTo>
+                  <a:pt x="9126464" y="34701"/>
+                  <a:pt x="8580678" y="-4904"/>
+                  <a:pt x="8357525" y="18288"/>
+                </a:cubicBezTo>
+                <a:cubicBezTo>
+                  <a:pt x="8134372" y="41480"/>
+                  <a:pt x="7903199" y="26458"/>
+                  <a:pt x="7679154" y="18288"/>
+                </a:cubicBezTo>
+                <a:cubicBezTo>
+                  <a:pt x="7455109" y="10118"/>
+                  <a:pt x="7435944" y="27109"/>
+                  <a:pt x="7217862" y="18288"/>
+                </a:cubicBezTo>
+                <a:cubicBezTo>
+                  <a:pt x="6999780" y="9467"/>
+                  <a:pt x="6680409" y="18985"/>
+                  <a:pt x="6539492" y="18288"/>
+                </a:cubicBezTo>
+                <a:cubicBezTo>
+                  <a:pt x="6398575" y="17592"/>
+                  <a:pt x="6312077" y="33018"/>
+                  <a:pt x="6186739" y="18288"/>
+                </a:cubicBezTo>
+                <a:cubicBezTo>
+                  <a:pt x="6061401" y="3558"/>
+                  <a:pt x="5947033" y="12075"/>
+                  <a:pt x="5833986" y="18288"/>
+                </a:cubicBezTo>
+                <a:cubicBezTo>
+                  <a:pt x="5720939" y="24501"/>
+                  <a:pt x="5482226" y="8586"/>
+                  <a:pt x="5155616" y="18288"/>
+                </a:cubicBezTo>
+                <a:cubicBezTo>
+                  <a:pt x="4829006" y="27991"/>
+                  <a:pt x="4841274" y="29316"/>
+                  <a:pt x="4694324" y="18288"/>
+                </a:cubicBezTo>
+                <a:cubicBezTo>
+                  <a:pt x="4547374" y="7260"/>
+                  <a:pt x="4077675" y="7013"/>
+                  <a:pt x="3907414" y="18288"/>
+                </a:cubicBezTo>
+                <a:cubicBezTo>
+                  <a:pt x="3737153" y="29564"/>
+                  <a:pt x="3538393" y="21630"/>
+                  <a:pt x="3446122" y="18288"/>
+                </a:cubicBezTo>
+                <a:cubicBezTo>
+                  <a:pt x="3353851" y="14946"/>
+                  <a:pt x="2990320" y="-8091"/>
+                  <a:pt x="2659212" y="18288"/>
+                </a:cubicBezTo>
+                <a:cubicBezTo>
+                  <a:pt x="2328104" y="44667"/>
+                  <a:pt x="2427653" y="9607"/>
+                  <a:pt x="2306460" y="18288"/>
+                </a:cubicBezTo>
+                <a:cubicBezTo>
+                  <a:pt x="2185267" y="26969"/>
+                  <a:pt x="1719763" y="3717"/>
+                  <a:pt x="1519550" y="18288"/>
+                </a:cubicBezTo>
+                <a:cubicBezTo>
+                  <a:pt x="1319337" y="32860"/>
+                  <a:pt x="1167371" y="17040"/>
+                  <a:pt x="1058258" y="18288"/>
+                </a:cubicBezTo>
+                <a:cubicBezTo>
+                  <a:pt x="949145" y="19536"/>
+                  <a:pt x="780234" y="31447"/>
+                  <a:pt x="705505" y="18288"/>
+                </a:cubicBezTo>
+                <a:cubicBezTo>
+                  <a:pt x="630776" y="5129"/>
+                  <a:pt x="215796" y="30056"/>
+                  <a:pt x="0" y="18288"/>
+                </a:cubicBezTo>
+                <a:cubicBezTo>
+                  <a:pt x="-53" y="11301"/>
+                  <a:pt x="-649" y="7756"/>
+                  <a:pt x="0" y="0"/>
+                </a:cubicBezTo>
+                <a:close/>
+              </a:path>
+            </a:pathLst>
+          </a:custGeom>
+          <a:solidFill>
+            <a:schemeClr val="accent2"/>
+          </a:solidFill>
+          <a:ln w="41275" cap="rnd">
+            <a:solidFill>
+              <a:schemeClr val="accent2"/>
+            </a:solidFill>
+            <a:round/>
+            <a:extLst>
+              <a:ext uri="{C807C97D-BFC1-408E-A445-0C87EB9F89A2}">
+                <ask:lineSketchStyleProps xmlns:ask="http://schemas.microsoft.com/office/drawing/2018/sketchyshapes" sd="1219033472">
+                  <a:prstGeom prst="rect">
+                    <a:avLst/>
+                  </a:prstGeom>
+                  <ask:type>
+                    <ask:lineSketchFreehand/>
+                  </ask:type>
+                </ask:lineSketchStyleProps>
+              </a:ext>
+            </a:extLst>
+          </a:ln>
+        </p:spPr>
+        <p:style>
+          <a:lnRef idx="2">
+            <a:schemeClr val="accent1">
+              <a:shade val="50000"/>
+            </a:schemeClr>
+          </a:lnRef>
+          <a:fillRef idx="1">
+            <a:schemeClr val="accent1"/>
+          </a:fillRef>
+          <a:effectRef idx="0">
+            <a:schemeClr val="accent1"/>
+          </a:effectRef>
+          <a:fontRef idx="minor">
+            <a:schemeClr val="lt1"/>
+          </a:fontRef>
+        </p:style>
+        <p:txBody>
+          <a:bodyPr rtlCol="0" anchor="ctr"/>
+          <a:lstStyle/>
+          <a:p>
+            <a:pPr algn="ctr"/>
+            <a:endParaRPr lang="en-US"/>
+          </a:p>
+        </p:txBody>
+      </p:sp>
+      <p:pic>
+        <p:nvPicPr>
+          <p:cNvPr id="6" name="Picture 5">
+            <a:extLst>
+              <a:ext uri="{FF2B5EF4-FFF2-40B4-BE49-F238E27FC236}">
+                <a16:creationId xmlns:a16="http://schemas.microsoft.com/office/drawing/2014/main" id="{05A44FFB-595E-4484-81FA-6F32B7C8D0EF}"/>
+              </a:ext>
+            </a:extLst>
+          </p:cNvPr>
+          <p:cNvPicPr>
+            <a:picLocks noChangeAspect="1"/>
+          </p:cNvPicPr>
+          <p:nvPr/>
+        </p:nvPicPr>
+        <p:blipFill>
+          <a:blip r:embed="rId3"/>
+          <a:stretch>
+            <a:fillRect/>
+          </a:stretch>
+        </p:blipFill>
+        <p:spPr>
+          <a:xfrm>
+            <a:off x="5271720" y="1886439"/>
+            <a:ext cx="6251244" cy="4974048"/>
+          </a:xfrm>
+          <a:prstGeom prst="rect">
+            <a:avLst/>
+          </a:prstGeom>
+        </p:spPr>
+      </p:pic>
+      <p:sp>
+        <p:nvSpPr>
+          <p:cNvPr id="9" name="Content Placeholder 2">
+            <a:extLst>
+              <a:ext uri="{FF2B5EF4-FFF2-40B4-BE49-F238E27FC236}">
+                <a16:creationId xmlns:a16="http://schemas.microsoft.com/office/drawing/2014/main" id="{CAE6F437-A269-472C-A5CA-AF18F6D7D634}"/>
               </a:ext>
             </a:extLst>
           </p:cNvPr>
@@ -15033,58 +17664,69 @@
         </p:nvSpPr>
         <p:spPr>
           <a:xfrm>
-            <a:off x="838200" y="1825625"/>
-            <a:ext cx="2924175" cy="4351338"/>
+            <a:off x="844767" y="2055813"/>
+            <a:ext cx="4265851" cy="4351338"/>
           </a:xfrm>
         </p:spPr>
         <p:txBody>
           <a:bodyPr/>
           <a:lstStyle/>
           <a:p>
-            <a:endParaRPr lang="en-US" dirty="0"/>
+            <a:r>
+              <a:rPr lang="en-US" sz="2200" dirty="0"/>
+              <a:t>For the </a:t>
+            </a:r>
+            <a:r>
+              <a:rPr lang="en-US" sz="2200" b="1" dirty="0"/>
+              <a:t>overall data:</a:t>
+            </a:r>
+            <a:r>
+              <a:rPr lang="en-US" sz="2200" dirty="0"/>
+              <a:t> all methods performed relatively well; oversampling had excellent results whereas </a:t>
+            </a:r>
+            <a:r>
+              <a:rPr lang="en-US" sz="2200" dirty="0" err="1"/>
+              <a:t>undersampling</a:t>
+            </a:r>
+            <a:r>
+              <a:rPr lang="en-US" sz="2200" dirty="0"/>
+              <a:t> did not</a:t>
+            </a:r>
+          </a:p>
+          <a:p>
+            <a:r>
+              <a:rPr lang="en-US" sz="2200" dirty="0"/>
+              <a:t>Per </a:t>
+            </a:r>
+            <a:r>
+              <a:rPr lang="en-US" sz="2200" b="1" dirty="0"/>
+              <a:t>category of quality:</a:t>
+            </a:r>
+            <a:r>
+              <a:rPr lang="en-US" sz="2200" dirty="0"/>
+              <a:t> low baseline rates of the rare classifications (low and high quality); </a:t>
+            </a:r>
+            <a:r>
+              <a:rPr lang="en-US" sz="2200" dirty="0" err="1"/>
+              <a:t>undersampling</a:t>
+            </a:r>
+            <a:r>
+              <a:rPr lang="en-US" sz="2200" dirty="0"/>
+              <a:t> had minimal improvement while oversampling had substantive improvement with small losses in normal category</a:t>
+            </a:r>
+          </a:p>
+          <a:p>
+            <a:pPr marL="0" indent="0">
+              <a:buNone/>
+            </a:pPr>
+            <a:endParaRPr lang="en-US" sz="1900" dirty="0"/>
           </a:p>
         </p:txBody>
       </p:sp>
-      <p:pic>
-        <p:nvPicPr>
-          <p:cNvPr id="9" name="Picture 8" descr="Graphical user interface, table&#10;&#10;Description automatically generated with medium confidence">
-            <a:extLst>
-              <a:ext uri="{FF2B5EF4-FFF2-40B4-BE49-F238E27FC236}">
-                <a16:creationId xmlns:a16="http://schemas.microsoft.com/office/drawing/2014/main" id="{7B2C2ABD-90EA-4599-8D56-1F74BB9E0F77}"/>
-              </a:ext>
-            </a:extLst>
-          </p:cNvPr>
-          <p:cNvPicPr>
-            <a:picLocks noChangeAspect="1"/>
-          </p:cNvPicPr>
-          <p:nvPr/>
-        </p:nvPicPr>
-        <p:blipFill>
-          <a:blip r:embed="rId2">
-            <a:extLst>
-              <a:ext uri="{28A0092B-C50C-407E-A947-70E740481C1C}">
-                <a14:useLocalDpi xmlns:a14="http://schemas.microsoft.com/office/drawing/2010/main" val="0"/>
-              </a:ext>
-            </a:extLst>
-          </a:blip>
-          <a:stretch>
-            <a:fillRect/>
-          </a:stretch>
-        </p:blipFill>
-        <p:spPr>
-          <a:xfrm>
-            <a:off x="5085885" y="532996"/>
-            <a:ext cx="6687483" cy="5792008"/>
-          </a:xfrm>
-          <a:prstGeom prst="rect">
-            <a:avLst/>
-          </a:prstGeom>
-        </p:spPr>
-      </p:pic>
     </p:spTree>
     <p:extLst>
       <p:ext uri="{BB962C8B-B14F-4D97-AF65-F5344CB8AC3E}">
-        <p14:creationId xmlns:p14="http://schemas.microsoft.com/office/powerpoint/2010/main" val="4072117366"/>
+        <p14:creationId xmlns:p14="http://schemas.microsoft.com/office/powerpoint/2010/main" val="3304124175"/>
       </p:ext>
     </p:extLst>
   </p:cSld>

</xml_diff>